<commit_message>
Update BvS - C Socket Präsentation - Gruppe 8.pptx
</commit_message>
<xml_diff>
--- a/Dokumente/BvS - C Socket Präsentation - Gruppe 8.pptx
+++ b/Dokumente/BvS - C Socket Präsentation - Gruppe 8.pptx
@@ -21,8 +21,9 @@
     <p:sldId id="265" r:id="rId15"/>
     <p:sldId id="266" r:id="rId16"/>
     <p:sldId id="267" r:id="rId17"/>
-    <p:sldId id="277" r:id="rId18"/>
-    <p:sldId id="269" r:id="rId19"/>
+    <p:sldId id="278" r:id="rId18"/>
+    <p:sldId id="277" r:id="rId19"/>
+    <p:sldId id="269" r:id="rId20"/>
   </p:sldIdLst>
   <p:sldSz cx="12192000" cy="6858000"/>
   <p:notesSz cx="6858000" cy="9144000"/>
@@ -160,7 +161,7 @@
           <p:cNvPr id="2" name="Title 1">
             <a:extLst>
               <a:ext uri="{FF2B5EF4-FFF2-40B4-BE49-F238E27FC236}">
-                <a16:creationId xmlns:a16="http://schemas.microsoft.com/office/drawing/2014/main" xmlns="" id="{BCBA1826-1B3E-4E2E-8D6C-93BCEAA3D6C6}"/>
+                <a16:creationId xmlns:a16="http://schemas.microsoft.com/office/drawing/2014/main" id="{BCBA1826-1B3E-4E2E-8D6C-93BCEAA3D6C6}"/>
               </a:ext>
             </a:extLst>
           </p:cNvPr>
@@ -200,7 +201,7 @@
           <p:cNvPr id="3" name="Subtitle 2">
             <a:extLst>
               <a:ext uri="{FF2B5EF4-FFF2-40B4-BE49-F238E27FC236}">
-                <a16:creationId xmlns:a16="http://schemas.microsoft.com/office/drawing/2014/main" xmlns="" id="{AAB5F0CE-1714-4650-9690-5676C06349A0}"/>
+                <a16:creationId xmlns:a16="http://schemas.microsoft.com/office/drawing/2014/main" id="{AAB5F0CE-1714-4650-9690-5676C06349A0}"/>
               </a:ext>
             </a:extLst>
           </p:cNvPr>
@@ -276,7 +277,7 @@
           <p:cNvPr id="4" name="Date Placeholder 3">
             <a:extLst>
               <a:ext uri="{FF2B5EF4-FFF2-40B4-BE49-F238E27FC236}">
-                <a16:creationId xmlns:a16="http://schemas.microsoft.com/office/drawing/2014/main" xmlns="" id="{BFD0CA85-BF38-4762-934C-D00F2047C2D1}"/>
+                <a16:creationId xmlns:a16="http://schemas.microsoft.com/office/drawing/2014/main" id="{BFD0CA85-BF38-4762-934C-D00F2047C2D1}"/>
               </a:ext>
             </a:extLst>
           </p:cNvPr>
@@ -305,7 +306,7 @@
           <p:cNvPr id="5" name="Footer Placeholder 4">
             <a:extLst>
               <a:ext uri="{FF2B5EF4-FFF2-40B4-BE49-F238E27FC236}">
-                <a16:creationId xmlns:a16="http://schemas.microsoft.com/office/drawing/2014/main" xmlns="" id="{649CA3C9-6579-49D9-A5FD-20231FB4B357}"/>
+                <a16:creationId xmlns:a16="http://schemas.microsoft.com/office/drawing/2014/main" id="{649CA3C9-6579-49D9-A5FD-20231FB4B357}"/>
               </a:ext>
             </a:extLst>
           </p:cNvPr>
@@ -330,7 +331,7 @@
           <p:cNvPr id="6" name="Slide Number Placeholder 5">
             <a:extLst>
               <a:ext uri="{FF2B5EF4-FFF2-40B4-BE49-F238E27FC236}">
-                <a16:creationId xmlns:a16="http://schemas.microsoft.com/office/drawing/2014/main" xmlns="" id="{BB9B94FE-6287-4D49-B0E5-FE9A9BA75A0C}"/>
+                <a16:creationId xmlns:a16="http://schemas.microsoft.com/office/drawing/2014/main" id="{BB9B94FE-6287-4D49-B0E5-FE9A9BA75A0C}"/>
               </a:ext>
             </a:extLst>
           </p:cNvPr>
@@ -359,7 +360,7 @@
           <p:cNvPr id="7" name="Straight Connector 6">
             <a:extLst>
               <a:ext uri="{FF2B5EF4-FFF2-40B4-BE49-F238E27FC236}">
-                <a16:creationId xmlns:a16="http://schemas.microsoft.com/office/drawing/2014/main" xmlns="" id="{AE0C0B2A-3FD1-4235-A16E-0ED1E028A93E}"/>
+                <a16:creationId xmlns:a16="http://schemas.microsoft.com/office/drawing/2014/main" id="{AE0C0B2A-3FD1-4235-A16E-0ED1E028A93E}"/>
               </a:ext>
             </a:extLst>
           </p:cNvPr>
@@ -402,7 +403,7 @@
           <p:cNvPr id="8" name="Group 7">
             <a:extLst>
               <a:ext uri="{FF2B5EF4-FFF2-40B4-BE49-F238E27FC236}">
-                <a16:creationId xmlns:a16="http://schemas.microsoft.com/office/drawing/2014/main" xmlns="" id="{9494E066-0146-46E9-BAF1-C33240ABA294}"/>
+                <a16:creationId xmlns:a16="http://schemas.microsoft.com/office/drawing/2014/main" id="{9494E066-0146-46E9-BAF1-C33240ABA294}"/>
               </a:ext>
             </a:extLst>
           </p:cNvPr>
@@ -422,7 +423,7 @@
             <p:cNvPr id="9" name="Group 8">
               <a:extLst>
                 <a:ext uri="{FF2B5EF4-FFF2-40B4-BE49-F238E27FC236}">
-                  <a16:creationId xmlns:a16="http://schemas.microsoft.com/office/drawing/2014/main" xmlns="" id="{B02BD80B-C499-4DAC-9580-575B04F8658F}"/>
+                  <a16:creationId xmlns:a16="http://schemas.microsoft.com/office/drawing/2014/main" id="{B02BD80B-C499-4DAC-9580-575B04F8658F}"/>
                 </a:ext>
               </a:extLst>
             </p:cNvPr>
@@ -442,7 +443,7 @@
               <p:cNvPr id="11" name="Freeform 68">
                 <a:extLst>
                   <a:ext uri="{FF2B5EF4-FFF2-40B4-BE49-F238E27FC236}">
-                    <a16:creationId xmlns:a16="http://schemas.microsoft.com/office/drawing/2014/main" xmlns="" id="{CCF069F3-858C-4C67-90C2-46017C3D4CEB}"/>
+                    <a16:creationId xmlns:a16="http://schemas.microsoft.com/office/drawing/2014/main" id="{CCF069F3-858C-4C67-90C2-46017C3D4CEB}"/>
                   </a:ext>
                 </a:extLst>
               </p:cNvPr>
@@ -545,7 +546,7 @@
               <p:cNvPr id="12" name="Freeform 69">
                 <a:extLst>
                   <a:ext uri="{FF2B5EF4-FFF2-40B4-BE49-F238E27FC236}">
-                    <a16:creationId xmlns:a16="http://schemas.microsoft.com/office/drawing/2014/main" xmlns="" id="{8A1FFA52-DFA8-4A81-8A85-50BE13257F51}"/>
+                    <a16:creationId xmlns:a16="http://schemas.microsoft.com/office/drawing/2014/main" id="{8A1FFA52-DFA8-4A81-8A85-50BE13257F51}"/>
                   </a:ext>
                 </a:extLst>
               </p:cNvPr>
@@ -649,7 +650,7 @@
             <p:cNvPr id="10" name="Line 70">
               <a:extLst>
                 <a:ext uri="{FF2B5EF4-FFF2-40B4-BE49-F238E27FC236}">
-                  <a16:creationId xmlns:a16="http://schemas.microsoft.com/office/drawing/2014/main" xmlns="" id="{BAEDA471-60CB-4A0C-B9AD-B2B3C51EA2FD}"/>
+                  <a16:creationId xmlns:a16="http://schemas.microsoft.com/office/drawing/2014/main" id="{BAEDA471-60CB-4A0C-B9AD-B2B3C51EA2FD}"/>
                 </a:ext>
               </a:extLst>
             </p:cNvPr>
@@ -734,7 +735,7 @@
           <p:cNvPr id="2" name="Title 1">
             <a:extLst>
               <a:ext uri="{FF2B5EF4-FFF2-40B4-BE49-F238E27FC236}">
-                <a16:creationId xmlns:a16="http://schemas.microsoft.com/office/drawing/2014/main" xmlns="" id="{072FB6D0-92CA-4910-AE77-E238F4C89D52}"/>
+                <a16:creationId xmlns:a16="http://schemas.microsoft.com/office/drawing/2014/main" id="{072FB6D0-92CA-4910-AE77-E238F4C89D52}"/>
               </a:ext>
             </a:extLst>
           </p:cNvPr>
@@ -762,7 +763,7 @@
           <p:cNvPr id="3" name="Vertical Text Placeholder 2">
             <a:extLst>
               <a:ext uri="{FF2B5EF4-FFF2-40B4-BE49-F238E27FC236}">
-                <a16:creationId xmlns:a16="http://schemas.microsoft.com/office/drawing/2014/main" xmlns="" id="{7A913172-A138-4DD4-A5B1-58BA62507824}"/>
+                <a16:creationId xmlns:a16="http://schemas.microsoft.com/office/drawing/2014/main" id="{7A913172-A138-4DD4-A5B1-58BA62507824}"/>
               </a:ext>
             </a:extLst>
           </p:cNvPr>
@@ -819,7 +820,7 @@
           <p:cNvPr id="4" name="Date Placeholder 3">
             <a:extLst>
               <a:ext uri="{FF2B5EF4-FFF2-40B4-BE49-F238E27FC236}">
-                <a16:creationId xmlns:a16="http://schemas.microsoft.com/office/drawing/2014/main" xmlns="" id="{373897B9-E4AD-469B-A60D-9A1A4BD1980A}"/>
+                <a16:creationId xmlns:a16="http://schemas.microsoft.com/office/drawing/2014/main" id="{373897B9-E4AD-469B-A60D-9A1A4BD1980A}"/>
               </a:ext>
             </a:extLst>
           </p:cNvPr>
@@ -848,7 +849,7 @@
           <p:cNvPr id="5" name="Footer Placeholder 4">
             <a:extLst>
               <a:ext uri="{FF2B5EF4-FFF2-40B4-BE49-F238E27FC236}">
-                <a16:creationId xmlns:a16="http://schemas.microsoft.com/office/drawing/2014/main" xmlns="" id="{31C5E1B0-48D6-4F99-9955-39958BA969EC}"/>
+                <a16:creationId xmlns:a16="http://schemas.microsoft.com/office/drawing/2014/main" id="{31C5E1B0-48D6-4F99-9955-39958BA969EC}"/>
               </a:ext>
             </a:extLst>
           </p:cNvPr>
@@ -873,7 +874,7 @@
           <p:cNvPr id="6" name="Slide Number Placeholder 5">
             <a:extLst>
               <a:ext uri="{FF2B5EF4-FFF2-40B4-BE49-F238E27FC236}">
-                <a16:creationId xmlns:a16="http://schemas.microsoft.com/office/drawing/2014/main" xmlns="" id="{F59F49DA-55D4-4E36-AEB9-A0E99E31A87E}"/>
+                <a16:creationId xmlns:a16="http://schemas.microsoft.com/office/drawing/2014/main" id="{F59F49DA-55D4-4E36-AEB9-A0E99E31A87E}"/>
               </a:ext>
             </a:extLst>
           </p:cNvPr>
@@ -932,7 +933,7 @@
           <p:cNvPr id="2" name="Vertical Title 1">
             <a:extLst>
               <a:ext uri="{FF2B5EF4-FFF2-40B4-BE49-F238E27FC236}">
-                <a16:creationId xmlns:a16="http://schemas.microsoft.com/office/drawing/2014/main" xmlns="" id="{14FEBC7C-C5C1-4A79-A195-B35701C2897D}"/>
+                <a16:creationId xmlns:a16="http://schemas.microsoft.com/office/drawing/2014/main" id="{14FEBC7C-C5C1-4A79-A195-B35701C2897D}"/>
               </a:ext>
             </a:extLst>
           </p:cNvPr>
@@ -965,7 +966,7 @@
           <p:cNvPr id="3" name="Vertical Text Placeholder 2">
             <a:extLst>
               <a:ext uri="{FF2B5EF4-FFF2-40B4-BE49-F238E27FC236}">
-                <a16:creationId xmlns:a16="http://schemas.microsoft.com/office/drawing/2014/main" xmlns="" id="{B8D34A74-3328-469B-ABCA-96F2FE368737}"/>
+                <a16:creationId xmlns:a16="http://schemas.microsoft.com/office/drawing/2014/main" id="{B8D34A74-3328-469B-ABCA-96F2FE368737}"/>
               </a:ext>
             </a:extLst>
           </p:cNvPr>
@@ -1027,7 +1028,7 @@
           <p:cNvPr id="4" name="Date Placeholder 3">
             <a:extLst>
               <a:ext uri="{FF2B5EF4-FFF2-40B4-BE49-F238E27FC236}">
-                <a16:creationId xmlns:a16="http://schemas.microsoft.com/office/drawing/2014/main" xmlns="" id="{0BAE19AB-5637-455E-89C3-B41702C202D4}"/>
+                <a16:creationId xmlns:a16="http://schemas.microsoft.com/office/drawing/2014/main" id="{0BAE19AB-5637-455E-89C3-B41702C202D4}"/>
               </a:ext>
             </a:extLst>
           </p:cNvPr>
@@ -1056,7 +1057,7 @@
           <p:cNvPr id="5" name="Footer Placeholder 4">
             <a:extLst>
               <a:ext uri="{FF2B5EF4-FFF2-40B4-BE49-F238E27FC236}">
-                <a16:creationId xmlns:a16="http://schemas.microsoft.com/office/drawing/2014/main" xmlns="" id="{A364F2A3-EBEE-4F42-BAC2-A482F00E6747}"/>
+                <a16:creationId xmlns:a16="http://schemas.microsoft.com/office/drawing/2014/main" id="{A364F2A3-EBEE-4F42-BAC2-A482F00E6747}"/>
               </a:ext>
             </a:extLst>
           </p:cNvPr>
@@ -1081,7 +1082,7 @@
           <p:cNvPr id="6" name="Slide Number Placeholder 5">
             <a:extLst>
               <a:ext uri="{FF2B5EF4-FFF2-40B4-BE49-F238E27FC236}">
-                <a16:creationId xmlns:a16="http://schemas.microsoft.com/office/drawing/2014/main" xmlns="" id="{BBFE1C27-1A43-4B0B-88D0-0C5FE1DBE161}"/>
+                <a16:creationId xmlns:a16="http://schemas.microsoft.com/office/drawing/2014/main" id="{BBFE1C27-1A43-4B0B-88D0-0C5FE1DBE161}"/>
               </a:ext>
             </a:extLst>
           </p:cNvPr>
@@ -1140,7 +1141,7 @@
           <p:cNvPr id="2" name="Title 1">
             <a:extLst>
               <a:ext uri="{FF2B5EF4-FFF2-40B4-BE49-F238E27FC236}">
-                <a16:creationId xmlns:a16="http://schemas.microsoft.com/office/drawing/2014/main" xmlns="" id="{B5732E59-6597-437B-B2F8-E2DD1F86A8F8}"/>
+                <a16:creationId xmlns:a16="http://schemas.microsoft.com/office/drawing/2014/main" id="{B5732E59-6597-437B-B2F8-E2DD1F86A8F8}"/>
               </a:ext>
             </a:extLst>
           </p:cNvPr>
@@ -1168,7 +1169,7 @@
           <p:cNvPr id="3" name="Content Placeholder 2">
             <a:extLst>
               <a:ext uri="{FF2B5EF4-FFF2-40B4-BE49-F238E27FC236}">
-                <a16:creationId xmlns:a16="http://schemas.microsoft.com/office/drawing/2014/main" xmlns="" id="{70E3BC1D-912E-4012-84AC-A509C9EF4F4E}"/>
+                <a16:creationId xmlns:a16="http://schemas.microsoft.com/office/drawing/2014/main" id="{70E3BC1D-912E-4012-84AC-A509C9EF4F4E}"/>
               </a:ext>
             </a:extLst>
           </p:cNvPr>
@@ -1226,7 +1227,7 @@
           <p:cNvPr id="4" name="Date Placeholder 3">
             <a:extLst>
               <a:ext uri="{FF2B5EF4-FFF2-40B4-BE49-F238E27FC236}">
-                <a16:creationId xmlns:a16="http://schemas.microsoft.com/office/drawing/2014/main" xmlns="" id="{E977110C-4AA3-4101-B3BD-140B90AF99C9}"/>
+                <a16:creationId xmlns:a16="http://schemas.microsoft.com/office/drawing/2014/main" id="{E977110C-4AA3-4101-B3BD-140B90AF99C9}"/>
               </a:ext>
             </a:extLst>
           </p:cNvPr>
@@ -1255,7 +1256,7 @@
           <p:cNvPr id="5" name="Footer Placeholder 4">
             <a:extLst>
               <a:ext uri="{FF2B5EF4-FFF2-40B4-BE49-F238E27FC236}">
-                <a16:creationId xmlns:a16="http://schemas.microsoft.com/office/drawing/2014/main" xmlns="" id="{4C50F189-4D8E-4DE6-8295-CF92FA8BFDEF}"/>
+                <a16:creationId xmlns:a16="http://schemas.microsoft.com/office/drawing/2014/main" id="{4C50F189-4D8E-4DE6-8295-CF92FA8BFDEF}"/>
               </a:ext>
             </a:extLst>
           </p:cNvPr>
@@ -1280,7 +1281,7 @@
           <p:cNvPr id="6" name="Slide Number Placeholder 5">
             <a:extLst>
               <a:ext uri="{FF2B5EF4-FFF2-40B4-BE49-F238E27FC236}">
-                <a16:creationId xmlns:a16="http://schemas.microsoft.com/office/drawing/2014/main" xmlns="" id="{575F33EC-1ACF-4D46-AEA5-A20802210B75}"/>
+                <a16:creationId xmlns:a16="http://schemas.microsoft.com/office/drawing/2014/main" id="{575F33EC-1ACF-4D46-AEA5-A20802210B75}"/>
               </a:ext>
             </a:extLst>
           </p:cNvPr>
@@ -1339,7 +1340,7 @@
           <p:cNvPr id="2" name="Title 1">
             <a:extLst>
               <a:ext uri="{FF2B5EF4-FFF2-40B4-BE49-F238E27FC236}">
-                <a16:creationId xmlns:a16="http://schemas.microsoft.com/office/drawing/2014/main" xmlns="" id="{47045267-19A7-4A3D-9658-AD3F78DD35CB}"/>
+                <a16:creationId xmlns:a16="http://schemas.microsoft.com/office/drawing/2014/main" id="{47045267-19A7-4A3D-9658-AD3F78DD35CB}"/>
               </a:ext>
             </a:extLst>
           </p:cNvPr>
@@ -1379,7 +1380,7 @@
           <p:cNvPr id="3" name="Text Placeholder 2">
             <a:extLst>
               <a:ext uri="{FF2B5EF4-FFF2-40B4-BE49-F238E27FC236}">
-                <a16:creationId xmlns:a16="http://schemas.microsoft.com/office/drawing/2014/main" xmlns="" id="{85F17554-5672-499F-BEB9-AB069E6D15F2}"/>
+                <a16:creationId xmlns:a16="http://schemas.microsoft.com/office/drawing/2014/main" id="{85F17554-5672-499F-BEB9-AB069E6D15F2}"/>
               </a:ext>
             </a:extLst>
           </p:cNvPr>
@@ -1509,7 +1510,7 @@
           <p:cNvPr id="4" name="Date Placeholder 3">
             <a:extLst>
               <a:ext uri="{FF2B5EF4-FFF2-40B4-BE49-F238E27FC236}">
-                <a16:creationId xmlns:a16="http://schemas.microsoft.com/office/drawing/2014/main" xmlns="" id="{C0CBA3C6-C279-46AA-B4EE-5F861D83D2AC}"/>
+                <a16:creationId xmlns:a16="http://schemas.microsoft.com/office/drawing/2014/main" id="{C0CBA3C6-C279-46AA-B4EE-5F861D83D2AC}"/>
               </a:ext>
             </a:extLst>
           </p:cNvPr>
@@ -1538,7 +1539,7 @@
           <p:cNvPr id="5" name="Footer Placeholder 4">
             <a:extLst>
               <a:ext uri="{FF2B5EF4-FFF2-40B4-BE49-F238E27FC236}">
-                <a16:creationId xmlns:a16="http://schemas.microsoft.com/office/drawing/2014/main" xmlns="" id="{F04C125B-DDB9-4F4E-B9E9-A747E648FC92}"/>
+                <a16:creationId xmlns:a16="http://schemas.microsoft.com/office/drawing/2014/main" id="{F04C125B-DDB9-4F4E-B9E9-A747E648FC92}"/>
               </a:ext>
             </a:extLst>
           </p:cNvPr>
@@ -1563,7 +1564,7 @@
           <p:cNvPr id="6" name="Slide Number Placeholder 5">
             <a:extLst>
               <a:ext uri="{FF2B5EF4-FFF2-40B4-BE49-F238E27FC236}">
-                <a16:creationId xmlns:a16="http://schemas.microsoft.com/office/drawing/2014/main" xmlns="" id="{A83D465E-E86B-42A8-B18A-9046E40D63D6}"/>
+                <a16:creationId xmlns:a16="http://schemas.microsoft.com/office/drawing/2014/main" id="{A83D465E-E86B-42A8-B18A-9046E40D63D6}"/>
               </a:ext>
             </a:extLst>
           </p:cNvPr>
@@ -1592,7 +1593,7 @@
           <p:cNvPr id="7" name="Oval 6">
             <a:extLst>
               <a:ext uri="{FF2B5EF4-FFF2-40B4-BE49-F238E27FC236}">
-                <a16:creationId xmlns:a16="http://schemas.microsoft.com/office/drawing/2014/main" xmlns="" id="{6681007E-0E57-40DB-9A98-D04E0A05937B}"/>
+                <a16:creationId xmlns:a16="http://schemas.microsoft.com/office/drawing/2014/main" id="{6681007E-0E57-40DB-9A98-D04E0A05937B}"/>
               </a:ext>
             </a:extLst>
           </p:cNvPr>
@@ -1649,7 +1650,7 @@
           <p:cNvPr id="8" name="Group 7">
             <a:extLst>
               <a:ext uri="{FF2B5EF4-FFF2-40B4-BE49-F238E27FC236}">
-                <a16:creationId xmlns:a16="http://schemas.microsoft.com/office/drawing/2014/main" xmlns="" id="{4C2D7ED2-BAE3-470E-9EFF-F2A49EDD9767}"/>
+                <a16:creationId xmlns:a16="http://schemas.microsoft.com/office/drawing/2014/main" id="{4C2D7ED2-BAE3-470E-9EFF-F2A49EDD9767}"/>
               </a:ext>
             </a:extLst>
           </p:cNvPr>
@@ -1669,7 +1670,7 @@
             <p:cNvPr id="9" name="Group 8">
               <a:extLst>
                 <a:ext uri="{FF2B5EF4-FFF2-40B4-BE49-F238E27FC236}">
-                  <a16:creationId xmlns:a16="http://schemas.microsoft.com/office/drawing/2014/main" xmlns="" id="{15B14D1A-9E1B-41C3-96AA-A5C40C4F9B3A}"/>
+                  <a16:creationId xmlns:a16="http://schemas.microsoft.com/office/drawing/2014/main" id="{15B14D1A-9E1B-41C3-96AA-A5C40C4F9B3A}"/>
                 </a:ext>
               </a:extLst>
             </p:cNvPr>
@@ -1689,7 +1690,7 @@
               <p:cNvPr id="14" name="Freeform 68">
                 <a:extLst>
                   <a:ext uri="{FF2B5EF4-FFF2-40B4-BE49-F238E27FC236}">
-                    <a16:creationId xmlns:a16="http://schemas.microsoft.com/office/drawing/2014/main" xmlns="" id="{00EC83EC-04A6-4533-80A5-B1817F1FB35E}"/>
+                    <a16:creationId xmlns:a16="http://schemas.microsoft.com/office/drawing/2014/main" id="{00EC83EC-04A6-4533-80A5-B1817F1FB35E}"/>
                   </a:ext>
                 </a:extLst>
               </p:cNvPr>
@@ -1792,7 +1793,7 @@
               <p:cNvPr id="15" name="Freeform 69">
                 <a:extLst>
                   <a:ext uri="{FF2B5EF4-FFF2-40B4-BE49-F238E27FC236}">
-                    <a16:creationId xmlns:a16="http://schemas.microsoft.com/office/drawing/2014/main" xmlns="" id="{BF61FF24-9074-4265-ACF4-1AEC3621B766}"/>
+                    <a16:creationId xmlns:a16="http://schemas.microsoft.com/office/drawing/2014/main" id="{BF61FF24-9074-4265-ACF4-1AEC3621B766}"/>
                   </a:ext>
                 </a:extLst>
               </p:cNvPr>
@@ -1895,7 +1896,7 @@
               <p:cNvPr id="16" name="Line 70">
                 <a:extLst>
                   <a:ext uri="{FF2B5EF4-FFF2-40B4-BE49-F238E27FC236}">
-                    <a16:creationId xmlns:a16="http://schemas.microsoft.com/office/drawing/2014/main" xmlns="" id="{8D31D9FF-672B-4C5E-B4B2-DD86A124413F}"/>
+                    <a16:creationId xmlns:a16="http://schemas.microsoft.com/office/drawing/2014/main" id="{8D31D9FF-672B-4C5E-B4B2-DD86A124413F}"/>
                   </a:ext>
                 </a:extLst>
               </p:cNvPr>
@@ -1950,7 +1951,7 @@
             <p:cNvPr id="10" name="Group 9">
               <a:extLst>
                 <a:ext uri="{FF2B5EF4-FFF2-40B4-BE49-F238E27FC236}">
-                  <a16:creationId xmlns:a16="http://schemas.microsoft.com/office/drawing/2014/main" xmlns="" id="{8991EBFD-EBD5-48CE-9178-AF5B6F50D416}"/>
+                  <a16:creationId xmlns:a16="http://schemas.microsoft.com/office/drawing/2014/main" id="{8991EBFD-EBD5-48CE-9178-AF5B6F50D416}"/>
                 </a:ext>
               </a:extLst>
             </p:cNvPr>
@@ -1970,7 +1971,7 @@
               <p:cNvPr id="11" name="Freeform 68">
                 <a:extLst>
                   <a:ext uri="{FF2B5EF4-FFF2-40B4-BE49-F238E27FC236}">
-                    <a16:creationId xmlns:a16="http://schemas.microsoft.com/office/drawing/2014/main" xmlns="" id="{1B45F046-3129-4A30-9402-44BA590CD1B6}"/>
+                    <a16:creationId xmlns:a16="http://schemas.microsoft.com/office/drawing/2014/main" id="{1B45F046-3129-4A30-9402-44BA590CD1B6}"/>
                   </a:ext>
                 </a:extLst>
               </p:cNvPr>
@@ -2073,7 +2074,7 @@
               <p:cNvPr id="12" name="Freeform 69">
                 <a:extLst>
                   <a:ext uri="{FF2B5EF4-FFF2-40B4-BE49-F238E27FC236}">
-                    <a16:creationId xmlns:a16="http://schemas.microsoft.com/office/drawing/2014/main" xmlns="" id="{24589F32-BB2E-46B1-BAB5-75EA779C7A25}"/>
+                    <a16:creationId xmlns:a16="http://schemas.microsoft.com/office/drawing/2014/main" id="{24589F32-BB2E-46B1-BAB5-75EA779C7A25}"/>
                   </a:ext>
                 </a:extLst>
               </p:cNvPr>
@@ -2176,7 +2177,7 @@
               <p:cNvPr id="13" name="Line 70">
                 <a:extLst>
                   <a:ext uri="{FF2B5EF4-FFF2-40B4-BE49-F238E27FC236}">
-                    <a16:creationId xmlns:a16="http://schemas.microsoft.com/office/drawing/2014/main" xmlns="" id="{0BD46CA5-AE89-4413-AB8D-347179D88133}"/>
+                    <a16:creationId xmlns:a16="http://schemas.microsoft.com/office/drawing/2014/main" id="{0BD46CA5-AE89-4413-AB8D-347179D88133}"/>
                   </a:ext>
                 </a:extLst>
               </p:cNvPr>
@@ -2232,7 +2233,7 @@
           <p:cNvPr id="17" name="Straight Connector 16">
             <a:extLst>
               <a:ext uri="{FF2B5EF4-FFF2-40B4-BE49-F238E27FC236}">
-                <a16:creationId xmlns:a16="http://schemas.microsoft.com/office/drawing/2014/main" xmlns="" id="{4043A360-3214-4DB8-BD85-C6AE48D02D3A}"/>
+                <a16:creationId xmlns:a16="http://schemas.microsoft.com/office/drawing/2014/main" id="{4043A360-3214-4DB8-BD85-C6AE48D02D3A}"/>
               </a:ext>
             </a:extLst>
           </p:cNvPr>
@@ -2305,7 +2306,7 @@
           <p:cNvPr id="2" name="Title 1">
             <a:extLst>
               <a:ext uri="{FF2B5EF4-FFF2-40B4-BE49-F238E27FC236}">
-                <a16:creationId xmlns:a16="http://schemas.microsoft.com/office/drawing/2014/main" xmlns="" id="{6D84AEE3-6C7B-402E-B26D-1D079D78D307}"/>
+                <a16:creationId xmlns:a16="http://schemas.microsoft.com/office/drawing/2014/main" id="{6D84AEE3-6C7B-402E-B26D-1D079D78D307}"/>
               </a:ext>
             </a:extLst>
           </p:cNvPr>
@@ -2334,7 +2335,7 @@
           <p:cNvPr id="3" name="Content Placeholder 2">
             <a:extLst>
               <a:ext uri="{FF2B5EF4-FFF2-40B4-BE49-F238E27FC236}">
-                <a16:creationId xmlns:a16="http://schemas.microsoft.com/office/drawing/2014/main" xmlns="" id="{B1101641-6BDA-433D-9393-1DDACE06701C}"/>
+                <a16:creationId xmlns:a16="http://schemas.microsoft.com/office/drawing/2014/main" id="{B1101641-6BDA-433D-9393-1DDACE06701C}"/>
               </a:ext>
             </a:extLst>
           </p:cNvPr>
@@ -2397,7 +2398,7 @@
           <p:cNvPr id="4" name="Content Placeholder 3">
             <a:extLst>
               <a:ext uri="{FF2B5EF4-FFF2-40B4-BE49-F238E27FC236}">
-                <a16:creationId xmlns:a16="http://schemas.microsoft.com/office/drawing/2014/main" xmlns="" id="{DB8F8D2A-A489-488D-B1E1-23F36D3E95C7}"/>
+                <a16:creationId xmlns:a16="http://schemas.microsoft.com/office/drawing/2014/main" id="{DB8F8D2A-A489-488D-B1E1-23F36D3E95C7}"/>
               </a:ext>
             </a:extLst>
           </p:cNvPr>
@@ -2460,7 +2461,7 @@
           <p:cNvPr id="5" name="Date Placeholder 4">
             <a:extLst>
               <a:ext uri="{FF2B5EF4-FFF2-40B4-BE49-F238E27FC236}">
-                <a16:creationId xmlns:a16="http://schemas.microsoft.com/office/drawing/2014/main" xmlns="" id="{1CA242E8-AEEF-4BBD-94E9-86F89D69522C}"/>
+                <a16:creationId xmlns:a16="http://schemas.microsoft.com/office/drawing/2014/main" id="{1CA242E8-AEEF-4BBD-94E9-86F89D69522C}"/>
               </a:ext>
             </a:extLst>
           </p:cNvPr>
@@ -2489,7 +2490,7 @@
           <p:cNvPr id="6" name="Footer Placeholder 5">
             <a:extLst>
               <a:ext uri="{FF2B5EF4-FFF2-40B4-BE49-F238E27FC236}">
-                <a16:creationId xmlns:a16="http://schemas.microsoft.com/office/drawing/2014/main" xmlns="" id="{BD58D2CA-06C9-412D-A5D6-F97DDBBB03DB}"/>
+                <a16:creationId xmlns:a16="http://schemas.microsoft.com/office/drawing/2014/main" id="{BD58D2CA-06C9-412D-A5D6-F97DDBBB03DB}"/>
               </a:ext>
             </a:extLst>
           </p:cNvPr>
@@ -2514,7 +2515,7 @@
           <p:cNvPr id="7" name="Slide Number Placeholder 6">
             <a:extLst>
               <a:ext uri="{FF2B5EF4-FFF2-40B4-BE49-F238E27FC236}">
-                <a16:creationId xmlns:a16="http://schemas.microsoft.com/office/drawing/2014/main" xmlns="" id="{021A80D9-E04B-47BF-80DA-01E68346A51C}"/>
+                <a16:creationId xmlns:a16="http://schemas.microsoft.com/office/drawing/2014/main" id="{021A80D9-E04B-47BF-80DA-01E68346A51C}"/>
               </a:ext>
             </a:extLst>
           </p:cNvPr>
@@ -2573,7 +2574,7 @@
           <p:cNvPr id="2" name="Title 1">
             <a:extLst>
               <a:ext uri="{FF2B5EF4-FFF2-40B4-BE49-F238E27FC236}">
-                <a16:creationId xmlns:a16="http://schemas.microsoft.com/office/drawing/2014/main" xmlns="" id="{97A42251-8A4B-463E-982B-C657C3810F36}"/>
+                <a16:creationId xmlns:a16="http://schemas.microsoft.com/office/drawing/2014/main" id="{97A42251-8A4B-463E-982B-C657C3810F36}"/>
               </a:ext>
             </a:extLst>
           </p:cNvPr>
@@ -2607,7 +2608,7 @@
           <p:cNvPr id="3" name="Text Placeholder 2">
             <a:extLst>
               <a:ext uri="{FF2B5EF4-FFF2-40B4-BE49-F238E27FC236}">
-                <a16:creationId xmlns:a16="http://schemas.microsoft.com/office/drawing/2014/main" xmlns="" id="{61C74D5E-AC0B-46BF-8840-61CC89C3B6BE}"/>
+                <a16:creationId xmlns:a16="http://schemas.microsoft.com/office/drawing/2014/main" id="{61C74D5E-AC0B-46BF-8840-61CC89C3B6BE}"/>
               </a:ext>
             </a:extLst>
           </p:cNvPr>
@@ -2680,7 +2681,7 @@
           <p:cNvPr id="4" name="Content Placeholder 3">
             <a:extLst>
               <a:ext uri="{FF2B5EF4-FFF2-40B4-BE49-F238E27FC236}">
-                <a16:creationId xmlns:a16="http://schemas.microsoft.com/office/drawing/2014/main" xmlns="" id="{901A0738-7A90-4A35-AB98-9656D6187286}"/>
+                <a16:creationId xmlns:a16="http://schemas.microsoft.com/office/drawing/2014/main" id="{901A0738-7A90-4A35-AB98-9656D6187286}"/>
               </a:ext>
             </a:extLst>
           </p:cNvPr>
@@ -2743,7 +2744,7 @@
           <p:cNvPr id="5" name="Text Placeholder 4">
             <a:extLst>
               <a:ext uri="{FF2B5EF4-FFF2-40B4-BE49-F238E27FC236}">
-                <a16:creationId xmlns:a16="http://schemas.microsoft.com/office/drawing/2014/main" xmlns="" id="{5DADFE01-1BA7-4288-9355-8B2B508BE582}"/>
+                <a16:creationId xmlns:a16="http://schemas.microsoft.com/office/drawing/2014/main" id="{5DADFE01-1BA7-4288-9355-8B2B508BE582}"/>
               </a:ext>
             </a:extLst>
           </p:cNvPr>
@@ -2816,7 +2817,7 @@
           <p:cNvPr id="6" name="Content Placeholder 5">
             <a:extLst>
               <a:ext uri="{FF2B5EF4-FFF2-40B4-BE49-F238E27FC236}">
-                <a16:creationId xmlns:a16="http://schemas.microsoft.com/office/drawing/2014/main" xmlns="" id="{F7D49F77-6C55-47AC-B1AE-5D9906DBD7F6}"/>
+                <a16:creationId xmlns:a16="http://schemas.microsoft.com/office/drawing/2014/main" id="{F7D49F77-6C55-47AC-B1AE-5D9906DBD7F6}"/>
               </a:ext>
             </a:extLst>
           </p:cNvPr>
@@ -2879,7 +2880,7 @@
           <p:cNvPr id="7" name="Date Placeholder 6">
             <a:extLst>
               <a:ext uri="{FF2B5EF4-FFF2-40B4-BE49-F238E27FC236}">
-                <a16:creationId xmlns:a16="http://schemas.microsoft.com/office/drawing/2014/main" xmlns="" id="{21D8EF53-AF86-47E8-83DC-8C419847A639}"/>
+                <a16:creationId xmlns:a16="http://schemas.microsoft.com/office/drawing/2014/main" id="{21D8EF53-AF86-47E8-83DC-8C419847A639}"/>
               </a:ext>
             </a:extLst>
           </p:cNvPr>
@@ -2908,7 +2909,7 @@
           <p:cNvPr id="8" name="Footer Placeholder 7">
             <a:extLst>
               <a:ext uri="{FF2B5EF4-FFF2-40B4-BE49-F238E27FC236}">
-                <a16:creationId xmlns:a16="http://schemas.microsoft.com/office/drawing/2014/main" xmlns="" id="{5C01D653-ED9A-46D3-A97F-B5FA1DAE6CA9}"/>
+                <a16:creationId xmlns:a16="http://schemas.microsoft.com/office/drawing/2014/main" id="{5C01D653-ED9A-46D3-A97F-B5FA1DAE6CA9}"/>
               </a:ext>
             </a:extLst>
           </p:cNvPr>
@@ -2933,7 +2934,7 @@
           <p:cNvPr id="9" name="Slide Number Placeholder 8">
             <a:extLst>
               <a:ext uri="{FF2B5EF4-FFF2-40B4-BE49-F238E27FC236}">
-                <a16:creationId xmlns:a16="http://schemas.microsoft.com/office/drawing/2014/main" xmlns="" id="{CC5B9B66-64EA-4022-BD96-ECF2A80CE2F0}"/>
+                <a16:creationId xmlns:a16="http://schemas.microsoft.com/office/drawing/2014/main" id="{CC5B9B66-64EA-4022-BD96-ECF2A80CE2F0}"/>
               </a:ext>
             </a:extLst>
           </p:cNvPr>
@@ -2992,7 +2993,7 @@
           <p:cNvPr id="2" name="Title 1">
             <a:extLst>
               <a:ext uri="{FF2B5EF4-FFF2-40B4-BE49-F238E27FC236}">
-                <a16:creationId xmlns:a16="http://schemas.microsoft.com/office/drawing/2014/main" xmlns="" id="{D033B6B0-54DE-4F2D-84DD-D06CD3B117B4}"/>
+                <a16:creationId xmlns:a16="http://schemas.microsoft.com/office/drawing/2014/main" id="{D033B6B0-54DE-4F2D-84DD-D06CD3B117B4}"/>
               </a:ext>
             </a:extLst>
           </p:cNvPr>
@@ -3020,7 +3021,7 @@
           <p:cNvPr id="3" name="Date Placeholder 2">
             <a:extLst>
               <a:ext uri="{FF2B5EF4-FFF2-40B4-BE49-F238E27FC236}">
-                <a16:creationId xmlns:a16="http://schemas.microsoft.com/office/drawing/2014/main" xmlns="" id="{AEFFE053-BB16-4940-B248-2D496BB29975}"/>
+                <a16:creationId xmlns:a16="http://schemas.microsoft.com/office/drawing/2014/main" id="{AEFFE053-BB16-4940-B248-2D496BB29975}"/>
               </a:ext>
             </a:extLst>
           </p:cNvPr>
@@ -3049,7 +3050,7 @@
           <p:cNvPr id="4" name="Footer Placeholder 3">
             <a:extLst>
               <a:ext uri="{FF2B5EF4-FFF2-40B4-BE49-F238E27FC236}">
-                <a16:creationId xmlns:a16="http://schemas.microsoft.com/office/drawing/2014/main" xmlns="" id="{31FBD80C-6CA1-42DB-B732-4807A27DA8C7}"/>
+                <a16:creationId xmlns:a16="http://schemas.microsoft.com/office/drawing/2014/main" id="{31FBD80C-6CA1-42DB-B732-4807A27DA8C7}"/>
               </a:ext>
             </a:extLst>
           </p:cNvPr>
@@ -3074,7 +3075,7 @@
           <p:cNvPr id="5" name="Slide Number Placeholder 4">
             <a:extLst>
               <a:ext uri="{FF2B5EF4-FFF2-40B4-BE49-F238E27FC236}">
-                <a16:creationId xmlns:a16="http://schemas.microsoft.com/office/drawing/2014/main" xmlns="" id="{B7A9DA86-C177-42C6-90F8-37C6844A2AA8}"/>
+                <a16:creationId xmlns:a16="http://schemas.microsoft.com/office/drawing/2014/main" id="{B7A9DA86-C177-42C6-90F8-37C6844A2AA8}"/>
               </a:ext>
             </a:extLst>
           </p:cNvPr>
@@ -3133,7 +3134,7 @@
           <p:cNvPr id="2" name="Date Placeholder 1">
             <a:extLst>
               <a:ext uri="{FF2B5EF4-FFF2-40B4-BE49-F238E27FC236}">
-                <a16:creationId xmlns:a16="http://schemas.microsoft.com/office/drawing/2014/main" xmlns="" id="{4746A27C-9BDA-43B3-96EA-C145EA7F04DE}"/>
+                <a16:creationId xmlns:a16="http://schemas.microsoft.com/office/drawing/2014/main" id="{4746A27C-9BDA-43B3-96EA-C145EA7F04DE}"/>
               </a:ext>
             </a:extLst>
           </p:cNvPr>
@@ -3162,7 +3163,7 @@
           <p:cNvPr id="3" name="Footer Placeholder 2">
             <a:extLst>
               <a:ext uri="{FF2B5EF4-FFF2-40B4-BE49-F238E27FC236}">
-                <a16:creationId xmlns:a16="http://schemas.microsoft.com/office/drawing/2014/main" xmlns="" id="{791FBD5E-AA17-42F1-8615-49F2664DD46F}"/>
+                <a16:creationId xmlns:a16="http://schemas.microsoft.com/office/drawing/2014/main" id="{791FBD5E-AA17-42F1-8615-49F2664DD46F}"/>
               </a:ext>
             </a:extLst>
           </p:cNvPr>
@@ -3187,7 +3188,7 @@
           <p:cNvPr id="4" name="Slide Number Placeholder 3">
             <a:extLst>
               <a:ext uri="{FF2B5EF4-FFF2-40B4-BE49-F238E27FC236}">
-                <a16:creationId xmlns:a16="http://schemas.microsoft.com/office/drawing/2014/main" xmlns="" id="{AE57A2D5-EBE5-43DD-8CF2-8B90801A0DF5}"/>
+                <a16:creationId xmlns:a16="http://schemas.microsoft.com/office/drawing/2014/main" id="{AE57A2D5-EBE5-43DD-8CF2-8B90801A0DF5}"/>
               </a:ext>
             </a:extLst>
           </p:cNvPr>
@@ -3246,7 +3247,7 @@
           <p:cNvPr id="2" name="Title 1">
             <a:extLst>
               <a:ext uri="{FF2B5EF4-FFF2-40B4-BE49-F238E27FC236}">
-                <a16:creationId xmlns:a16="http://schemas.microsoft.com/office/drawing/2014/main" xmlns="" id="{FE4451E1-40E1-4ED2-A9E3-6376E774AD27}"/>
+                <a16:creationId xmlns:a16="http://schemas.microsoft.com/office/drawing/2014/main" id="{FE4451E1-40E1-4ED2-A9E3-6376E774AD27}"/>
               </a:ext>
             </a:extLst>
           </p:cNvPr>
@@ -3286,7 +3287,7 @@
           <p:cNvPr id="3" name="Content Placeholder 2">
             <a:extLst>
               <a:ext uri="{FF2B5EF4-FFF2-40B4-BE49-F238E27FC236}">
-                <a16:creationId xmlns:a16="http://schemas.microsoft.com/office/drawing/2014/main" xmlns="" id="{49BAAE5E-AD83-40D4-8BDB-6B25250247AA}"/>
+                <a16:creationId xmlns:a16="http://schemas.microsoft.com/office/drawing/2014/main" id="{49BAAE5E-AD83-40D4-8BDB-6B25250247AA}"/>
               </a:ext>
             </a:extLst>
           </p:cNvPr>
@@ -3377,7 +3378,7 @@
           <p:cNvPr id="4" name="Text Placeholder 3">
             <a:extLst>
               <a:ext uri="{FF2B5EF4-FFF2-40B4-BE49-F238E27FC236}">
-                <a16:creationId xmlns:a16="http://schemas.microsoft.com/office/drawing/2014/main" xmlns="" id="{4D4DF8E2-A28B-4889-AD9E-1D733FEA2E0C}"/>
+                <a16:creationId xmlns:a16="http://schemas.microsoft.com/office/drawing/2014/main" id="{4D4DF8E2-A28B-4889-AD9E-1D733FEA2E0C}"/>
               </a:ext>
             </a:extLst>
           </p:cNvPr>
@@ -3450,7 +3451,7 @@
           <p:cNvPr id="5" name="Date Placeholder 4">
             <a:extLst>
               <a:ext uri="{FF2B5EF4-FFF2-40B4-BE49-F238E27FC236}">
-                <a16:creationId xmlns:a16="http://schemas.microsoft.com/office/drawing/2014/main" xmlns="" id="{A52EF812-B775-468C-84D9-4394CC19F298}"/>
+                <a16:creationId xmlns:a16="http://schemas.microsoft.com/office/drawing/2014/main" id="{A52EF812-B775-468C-84D9-4394CC19F298}"/>
               </a:ext>
             </a:extLst>
           </p:cNvPr>
@@ -3479,7 +3480,7 @@
           <p:cNvPr id="6" name="Footer Placeholder 5">
             <a:extLst>
               <a:ext uri="{FF2B5EF4-FFF2-40B4-BE49-F238E27FC236}">
-                <a16:creationId xmlns:a16="http://schemas.microsoft.com/office/drawing/2014/main" xmlns="" id="{9DE1DEB3-5237-467C-A5B6-EDA7F366EB60}"/>
+                <a16:creationId xmlns:a16="http://schemas.microsoft.com/office/drawing/2014/main" id="{9DE1DEB3-5237-467C-A5B6-EDA7F366EB60}"/>
               </a:ext>
             </a:extLst>
           </p:cNvPr>
@@ -3504,7 +3505,7 @@
           <p:cNvPr id="7" name="Slide Number Placeholder 6">
             <a:extLst>
               <a:ext uri="{FF2B5EF4-FFF2-40B4-BE49-F238E27FC236}">
-                <a16:creationId xmlns:a16="http://schemas.microsoft.com/office/drawing/2014/main" xmlns="" id="{41877A6B-440F-4D7B-92DA-1B964D029F12}"/>
+                <a16:creationId xmlns:a16="http://schemas.microsoft.com/office/drawing/2014/main" id="{41877A6B-440F-4D7B-92DA-1B964D029F12}"/>
               </a:ext>
             </a:extLst>
           </p:cNvPr>
@@ -3533,10 +3534,10 @@
           <p:cNvPr id="10" name="Straight Connector 9">
             <a:extLst>
               <a:ext uri="{FF2B5EF4-FFF2-40B4-BE49-F238E27FC236}">
-                <a16:creationId xmlns:a16="http://schemas.microsoft.com/office/drawing/2014/main" xmlns="" id="{DC89B2F1-1E32-44DB-B50E-BEA1896CAD81}"/>
+                <a16:creationId xmlns:a16="http://schemas.microsoft.com/office/drawing/2014/main" id="{DC89B2F1-1E32-44DB-B50E-BEA1896CAD81}"/>
               </a:ext>
               <a:ext uri="{C183D7F6-B498-43B3-948B-1728B52AA6E4}">
-                <adec:decorative xmlns:adec="http://schemas.microsoft.com/office/drawing/2017/decorative" xmlns="" val="0"/>
+                <adec:decorative xmlns:adec="http://schemas.microsoft.com/office/drawing/2017/decorative" val="0"/>
               </a:ext>
             </a:extLst>
           </p:cNvPr>
@@ -3611,7 +3612,7 @@
           <p:cNvPr id="2" name="Title 1">
             <a:extLst>
               <a:ext uri="{FF2B5EF4-FFF2-40B4-BE49-F238E27FC236}">
-                <a16:creationId xmlns:a16="http://schemas.microsoft.com/office/drawing/2014/main" xmlns="" id="{B8C6B204-119E-45DB-A177-995FF5D9B4E5}"/>
+                <a16:creationId xmlns:a16="http://schemas.microsoft.com/office/drawing/2014/main" id="{B8C6B204-119E-45DB-A177-995FF5D9B4E5}"/>
               </a:ext>
             </a:extLst>
           </p:cNvPr>
@@ -3651,7 +3652,7 @@
           <p:cNvPr id="3" name="Picture Placeholder 2">
             <a:extLst>
               <a:ext uri="{FF2B5EF4-FFF2-40B4-BE49-F238E27FC236}">
-                <a16:creationId xmlns:a16="http://schemas.microsoft.com/office/drawing/2014/main" xmlns="" id="{9CCD3036-53A8-4361-AAAC-D8072EB470FE}"/>
+                <a16:creationId xmlns:a16="http://schemas.microsoft.com/office/drawing/2014/main" id="{9CCD3036-53A8-4361-AAAC-D8072EB470FE}"/>
               </a:ext>
             </a:extLst>
           </p:cNvPr>
@@ -3722,7 +3723,7 @@
           <p:cNvPr id="4" name="Text Placeholder 3">
             <a:extLst>
               <a:ext uri="{FF2B5EF4-FFF2-40B4-BE49-F238E27FC236}">
-                <a16:creationId xmlns:a16="http://schemas.microsoft.com/office/drawing/2014/main" xmlns="" id="{D0FCFCD5-820E-47D9-9A60-57680C4C9405}"/>
+                <a16:creationId xmlns:a16="http://schemas.microsoft.com/office/drawing/2014/main" id="{D0FCFCD5-820E-47D9-9A60-57680C4C9405}"/>
               </a:ext>
             </a:extLst>
           </p:cNvPr>
@@ -3795,7 +3796,7 @@
           <p:cNvPr id="5" name="Date Placeholder 4">
             <a:extLst>
               <a:ext uri="{FF2B5EF4-FFF2-40B4-BE49-F238E27FC236}">
-                <a16:creationId xmlns:a16="http://schemas.microsoft.com/office/drawing/2014/main" xmlns="" id="{052446C3-A62E-4690-9098-53D59C4C33E0}"/>
+                <a16:creationId xmlns:a16="http://schemas.microsoft.com/office/drawing/2014/main" id="{052446C3-A62E-4690-9098-53D59C4C33E0}"/>
               </a:ext>
             </a:extLst>
           </p:cNvPr>
@@ -3824,7 +3825,7 @@
           <p:cNvPr id="6" name="Footer Placeholder 5">
             <a:extLst>
               <a:ext uri="{FF2B5EF4-FFF2-40B4-BE49-F238E27FC236}">
-                <a16:creationId xmlns:a16="http://schemas.microsoft.com/office/drawing/2014/main" xmlns="" id="{40A6C8B8-EA3D-45E5-950A-B6F1EA0B4782}"/>
+                <a16:creationId xmlns:a16="http://schemas.microsoft.com/office/drawing/2014/main" id="{40A6C8B8-EA3D-45E5-950A-B6F1EA0B4782}"/>
               </a:ext>
             </a:extLst>
           </p:cNvPr>
@@ -3849,7 +3850,7 @@
           <p:cNvPr id="7" name="Slide Number Placeholder 6">
             <a:extLst>
               <a:ext uri="{FF2B5EF4-FFF2-40B4-BE49-F238E27FC236}">
-                <a16:creationId xmlns:a16="http://schemas.microsoft.com/office/drawing/2014/main" xmlns="" id="{A72ACAB7-ADBF-42E5-A214-232BA9EFB3B6}"/>
+                <a16:creationId xmlns:a16="http://schemas.microsoft.com/office/drawing/2014/main" id="{A72ACAB7-ADBF-42E5-A214-232BA9EFB3B6}"/>
               </a:ext>
             </a:extLst>
           </p:cNvPr>
@@ -3878,10 +3879,10 @@
           <p:cNvPr id="9" name="Straight Connector 8">
             <a:extLst>
               <a:ext uri="{FF2B5EF4-FFF2-40B4-BE49-F238E27FC236}">
-                <a16:creationId xmlns:a16="http://schemas.microsoft.com/office/drawing/2014/main" xmlns="" id="{D0E80DA6-B971-46B7-B0D3-8581AE0B6ACB}"/>
+                <a16:creationId xmlns:a16="http://schemas.microsoft.com/office/drawing/2014/main" id="{D0E80DA6-B971-46B7-B0D3-8581AE0B6ACB}"/>
               </a:ext>
               <a:ext uri="{C183D7F6-B498-43B3-948B-1728B52AA6E4}">
-                <adec:decorative xmlns:adec="http://schemas.microsoft.com/office/drawing/2017/decorative" xmlns="" val="0"/>
+                <adec:decorative xmlns:adec="http://schemas.microsoft.com/office/drawing/2017/decorative" val="0"/>
               </a:ext>
             </a:extLst>
           </p:cNvPr>
@@ -3961,7 +3962,7 @@
           <p:cNvPr id="2" name="Title Placeholder 1">
             <a:extLst>
               <a:ext uri="{FF2B5EF4-FFF2-40B4-BE49-F238E27FC236}">
-                <a16:creationId xmlns:a16="http://schemas.microsoft.com/office/drawing/2014/main" xmlns="" id="{002DDA7E-8449-42D1-93BD-4E96C1BFC18D}"/>
+                <a16:creationId xmlns:a16="http://schemas.microsoft.com/office/drawing/2014/main" id="{002DDA7E-8449-42D1-93BD-4E96C1BFC18D}"/>
               </a:ext>
             </a:extLst>
           </p:cNvPr>
@@ -4000,7 +4001,7 @@
           <p:cNvPr id="3" name="Text Placeholder 2">
             <a:extLst>
               <a:ext uri="{FF2B5EF4-FFF2-40B4-BE49-F238E27FC236}">
-                <a16:creationId xmlns:a16="http://schemas.microsoft.com/office/drawing/2014/main" xmlns="" id="{1172EB64-DBC0-4012-830E-9166670D17C5}"/>
+                <a16:creationId xmlns:a16="http://schemas.microsoft.com/office/drawing/2014/main" id="{1172EB64-DBC0-4012-830E-9166670D17C5}"/>
               </a:ext>
             </a:extLst>
           </p:cNvPr>
@@ -4068,7 +4069,7 @@
           <p:cNvPr id="4" name="Date Placeholder 3">
             <a:extLst>
               <a:ext uri="{FF2B5EF4-FFF2-40B4-BE49-F238E27FC236}">
-                <a16:creationId xmlns:a16="http://schemas.microsoft.com/office/drawing/2014/main" xmlns="" id="{2749A3E9-8704-4E26-A519-8215B3E943F5}"/>
+                <a16:creationId xmlns:a16="http://schemas.microsoft.com/office/drawing/2014/main" id="{2749A3E9-8704-4E26-A519-8215B3E943F5}"/>
               </a:ext>
             </a:extLst>
           </p:cNvPr>
@@ -4119,7 +4120,7 @@
           <p:cNvPr id="5" name="Footer Placeholder 4">
             <a:extLst>
               <a:ext uri="{FF2B5EF4-FFF2-40B4-BE49-F238E27FC236}">
-                <a16:creationId xmlns:a16="http://schemas.microsoft.com/office/drawing/2014/main" xmlns="" id="{C8590E32-87A0-44C2-A299-D45FAB146E08}"/>
+                <a16:creationId xmlns:a16="http://schemas.microsoft.com/office/drawing/2014/main" id="{C8590E32-87A0-44C2-A299-D45FAB146E08}"/>
               </a:ext>
             </a:extLst>
           </p:cNvPr>
@@ -4163,7 +4164,7 @@
           <p:cNvPr id="6" name="Slide Number Placeholder 5">
             <a:extLst>
               <a:ext uri="{FF2B5EF4-FFF2-40B4-BE49-F238E27FC236}">
-                <a16:creationId xmlns:a16="http://schemas.microsoft.com/office/drawing/2014/main" xmlns="" id="{BE1C1A41-01A7-44E2-965B-ACFD4F2806FC}"/>
+                <a16:creationId xmlns:a16="http://schemas.microsoft.com/office/drawing/2014/main" id="{BE1C1A41-01A7-44E2-965B-ACFD4F2806FC}"/>
               </a:ext>
             </a:extLst>
           </p:cNvPr>
@@ -4563,10 +4564,10 @@
           <p:cNvPr id="9" name="Rectangle 8">
             <a:extLst>
               <a:ext uri="{FF2B5EF4-FFF2-40B4-BE49-F238E27FC236}">
-                <a16:creationId xmlns:a16="http://schemas.microsoft.com/office/drawing/2014/main" xmlns="" id="{D3F13AAF-525E-4953-A67E-7B34FDB4D899}"/>
+                <a16:creationId xmlns:a16="http://schemas.microsoft.com/office/drawing/2014/main" id="{D3F13AAF-525E-4953-A67E-7B34FDB4D899}"/>
               </a:ext>
               <a:ext uri="{C183D7F6-B498-43B3-948B-1728B52AA6E4}">
-                <adec:decorative xmlns:adec="http://schemas.microsoft.com/office/drawing/2017/decorative" xmlns="" val="1"/>
+                <adec:decorative xmlns:adec="http://schemas.microsoft.com/office/drawing/2017/decorative" val="1"/>
               </a:ext>
             </a:extLst>
           </p:cNvPr>
@@ -4576,7 +4577,7 @@
           <p:nvPr>
             <p:extLst>
               <p:ext uri="{386F3935-93C4-4BCD-93E2-E3B085C9AB24}">
-                <p16:designElem xmlns:p16="http://schemas.microsoft.com/office/powerpoint/2015/main" xmlns="" val="1"/>
+                <p16:designElem xmlns:p16="http://schemas.microsoft.com/office/powerpoint/2015/main" val="1"/>
               </p:ext>
             </p:extLst>
           </p:nvPr>
@@ -4639,7 +4640,7 @@
           <p:cNvPr id="2" name="Titel 1">
             <a:extLst>
               <a:ext uri="{FF2B5EF4-FFF2-40B4-BE49-F238E27FC236}">
-                <a16:creationId xmlns:a16="http://schemas.microsoft.com/office/drawing/2014/main" xmlns="" id="{1D5457D5-069C-7749-828E-ED35C0580252}"/>
+                <a16:creationId xmlns:a16="http://schemas.microsoft.com/office/drawing/2014/main" id="{1D5457D5-069C-7749-828E-ED35C0580252}"/>
               </a:ext>
             </a:extLst>
           </p:cNvPr>
@@ -4674,7 +4675,7 @@
           <p:cNvPr id="3" name="Untertitel 2">
             <a:extLst>
               <a:ext uri="{FF2B5EF4-FFF2-40B4-BE49-F238E27FC236}">
-                <a16:creationId xmlns:a16="http://schemas.microsoft.com/office/drawing/2014/main" xmlns="" id="{2F4F28D6-EA11-4542-9A27-04A2CD84CFE7}"/>
+                <a16:creationId xmlns:a16="http://schemas.microsoft.com/office/drawing/2014/main" id="{2F4F28D6-EA11-4542-9A27-04A2CD84CFE7}"/>
               </a:ext>
             </a:extLst>
           </p:cNvPr>
@@ -4763,7 +4764,7 @@
           <p:cNvPr id="4" name="Picture 3" descr="Gestapelte digital-gezeichnete Dreiecke, die ein Hintergrund bilden">
             <a:extLst>
               <a:ext uri="{FF2B5EF4-FFF2-40B4-BE49-F238E27FC236}">
-                <a16:creationId xmlns:a16="http://schemas.microsoft.com/office/drawing/2014/main" xmlns="" id="{057E9EA8-8909-425C-B899-897C611668AA}"/>
+                <a16:creationId xmlns:a16="http://schemas.microsoft.com/office/drawing/2014/main" id="{057E9EA8-8909-425C-B899-897C611668AA}"/>
               </a:ext>
             </a:extLst>
           </p:cNvPr>
@@ -4792,10 +4793,10 @@
           <p:cNvPr id="11" name="Straight Connector 10">
             <a:extLst>
               <a:ext uri="{FF2B5EF4-FFF2-40B4-BE49-F238E27FC236}">
-                <a16:creationId xmlns:a16="http://schemas.microsoft.com/office/drawing/2014/main" xmlns="" id="{32E97E5C-7A5F-424E-AAE4-654396E90799}"/>
+                <a16:creationId xmlns:a16="http://schemas.microsoft.com/office/drawing/2014/main" id="{32E97E5C-7A5F-424E-AAE4-654396E90799}"/>
               </a:ext>
               <a:ext uri="{C183D7F6-B498-43B3-948B-1728B52AA6E4}">
-                <adec:decorative xmlns:adec="http://schemas.microsoft.com/office/drawing/2017/decorative" xmlns="" val="1"/>
+                <adec:decorative xmlns:adec="http://schemas.microsoft.com/office/drawing/2017/decorative" val="1"/>
               </a:ext>
             </a:extLst>
           </p:cNvPr>
@@ -4805,7 +4806,7 @@
           <p:nvPr>
             <p:extLst>
               <p:ext uri="{386F3935-93C4-4BCD-93E2-E3B085C9AB24}">
-                <p16:designElem xmlns:p16="http://schemas.microsoft.com/office/powerpoint/2015/main" xmlns="" val="1"/>
+                <p16:designElem xmlns:p16="http://schemas.microsoft.com/office/powerpoint/2015/main" val="1"/>
               </p:ext>
             </p:extLst>
           </p:nvPr>
@@ -4874,7 +4875,7 @@
           <p:cNvPr id="2" name="Titel 1">
             <a:extLst>
               <a:ext uri="{FF2B5EF4-FFF2-40B4-BE49-F238E27FC236}">
-                <a16:creationId xmlns:a16="http://schemas.microsoft.com/office/drawing/2014/main" xmlns="" id="{93C1CD93-B848-084F-BBA3-68B8F892F035}"/>
+                <a16:creationId xmlns:a16="http://schemas.microsoft.com/office/drawing/2014/main" id="{93C1CD93-B848-084F-BBA3-68B8F892F035}"/>
               </a:ext>
             </a:extLst>
           </p:cNvPr>
@@ -4902,7 +4903,7 @@
           <p:cNvPr id="5" name="Inhaltsplatzhalter 4" descr="Ein Bild, das Text enthält.&#10;&#10;Automatisch generierte Beschreibung">
             <a:extLst>
               <a:ext uri="{FF2B5EF4-FFF2-40B4-BE49-F238E27FC236}">
-                <a16:creationId xmlns:a16="http://schemas.microsoft.com/office/drawing/2014/main" xmlns="" id="{B01FD024-579F-E94E-A141-2A94C4012D08}"/>
+                <a16:creationId xmlns:a16="http://schemas.microsoft.com/office/drawing/2014/main" id="{B01FD024-579F-E94E-A141-2A94C4012D08}"/>
               </a:ext>
             </a:extLst>
           </p:cNvPr>
@@ -4931,7 +4932,7 @@
           <p:cNvPr id="4" name="Rechteck 3">
             <a:extLst>
               <a:ext uri="{FF2B5EF4-FFF2-40B4-BE49-F238E27FC236}">
-                <a16:creationId xmlns:a16="http://schemas.microsoft.com/office/drawing/2014/main" xmlns="" id="{70CE85B4-8326-4E96-85CF-3AFC965BDFF2}"/>
+                <a16:creationId xmlns:a16="http://schemas.microsoft.com/office/drawing/2014/main" id="{70CE85B4-8326-4E96-85CF-3AFC965BDFF2}"/>
               </a:ext>
             </a:extLst>
           </p:cNvPr>
@@ -5013,7 +5014,7 @@
           <p:cNvPr id="2" name="Titel 1">
             <a:extLst>
               <a:ext uri="{FF2B5EF4-FFF2-40B4-BE49-F238E27FC236}">
-                <a16:creationId xmlns:a16="http://schemas.microsoft.com/office/drawing/2014/main" xmlns="" id="{93C1CD93-B848-084F-BBA3-68B8F892F035}"/>
+                <a16:creationId xmlns:a16="http://schemas.microsoft.com/office/drawing/2014/main" id="{93C1CD93-B848-084F-BBA3-68B8F892F035}"/>
               </a:ext>
             </a:extLst>
           </p:cNvPr>
@@ -5041,7 +5042,7 @@
           <p:cNvPr id="5" name="Inhaltsplatzhalter 4" descr="Ein Bild, das Text enthält.&#10;&#10;Automatisch generierte Beschreibung">
             <a:extLst>
               <a:ext uri="{FF2B5EF4-FFF2-40B4-BE49-F238E27FC236}">
-                <a16:creationId xmlns:a16="http://schemas.microsoft.com/office/drawing/2014/main" xmlns="" id="{B01FD024-579F-E94E-A141-2A94C4012D08}"/>
+                <a16:creationId xmlns:a16="http://schemas.microsoft.com/office/drawing/2014/main" id="{B01FD024-579F-E94E-A141-2A94C4012D08}"/>
               </a:ext>
             </a:extLst>
           </p:cNvPr>
@@ -5070,7 +5071,7 @@
           <p:cNvPr id="4" name="Rechteck 3">
             <a:extLst>
               <a:ext uri="{FF2B5EF4-FFF2-40B4-BE49-F238E27FC236}">
-                <a16:creationId xmlns:a16="http://schemas.microsoft.com/office/drawing/2014/main" xmlns="" id="{70CE85B4-8326-4E96-85CF-3AFC965BDFF2}"/>
+                <a16:creationId xmlns:a16="http://schemas.microsoft.com/office/drawing/2014/main" id="{70CE85B4-8326-4E96-85CF-3AFC965BDFF2}"/>
               </a:ext>
             </a:extLst>
           </p:cNvPr>
@@ -5152,7 +5153,7 @@
           <p:cNvPr id="5" name="Inhaltsplatzhalter 4" descr="Ein Bild, das Text enthält.&#10;&#10;Automatisch generierte Beschreibung">
             <a:extLst>
               <a:ext uri="{FF2B5EF4-FFF2-40B4-BE49-F238E27FC236}">
-                <a16:creationId xmlns:a16="http://schemas.microsoft.com/office/drawing/2014/main" xmlns="" id="{176625FD-A675-FE4A-9838-8D2CE43EB3B0}"/>
+                <a16:creationId xmlns:a16="http://schemas.microsoft.com/office/drawing/2014/main" id="{176625FD-A675-FE4A-9838-8D2CE43EB3B0}"/>
               </a:ext>
             </a:extLst>
           </p:cNvPr>
@@ -5181,7 +5182,7 @@
           <p:cNvPr id="2" name="Titel 1">
             <a:extLst>
               <a:ext uri="{FF2B5EF4-FFF2-40B4-BE49-F238E27FC236}">
-                <a16:creationId xmlns:a16="http://schemas.microsoft.com/office/drawing/2014/main" xmlns="" id="{5AD4CF47-00CA-9445-818B-86A9FEE94943}"/>
+                <a16:creationId xmlns:a16="http://schemas.microsoft.com/office/drawing/2014/main" id="{5AD4CF47-00CA-9445-818B-86A9FEE94943}"/>
               </a:ext>
             </a:extLst>
           </p:cNvPr>
@@ -5209,7 +5210,7 @@
           <p:cNvPr id="4" name="Rechteck 3">
             <a:extLst>
               <a:ext uri="{FF2B5EF4-FFF2-40B4-BE49-F238E27FC236}">
-                <a16:creationId xmlns:a16="http://schemas.microsoft.com/office/drawing/2014/main" xmlns="" id="{44A91D52-251F-446E-B340-685C4FB6FDB7}"/>
+                <a16:creationId xmlns:a16="http://schemas.microsoft.com/office/drawing/2014/main" id="{44A91D52-251F-446E-B340-685C4FB6FDB7}"/>
               </a:ext>
             </a:extLst>
           </p:cNvPr>
@@ -5291,7 +5292,7 @@
           <p:cNvPr id="5" name="Inhaltsplatzhalter 4" descr="Ein Bild, das Text enthält.&#10;&#10;Automatisch generierte Beschreibung">
             <a:extLst>
               <a:ext uri="{FF2B5EF4-FFF2-40B4-BE49-F238E27FC236}">
-                <a16:creationId xmlns:a16="http://schemas.microsoft.com/office/drawing/2014/main" xmlns="" id="{176625FD-A675-FE4A-9838-8D2CE43EB3B0}"/>
+                <a16:creationId xmlns:a16="http://schemas.microsoft.com/office/drawing/2014/main" id="{176625FD-A675-FE4A-9838-8D2CE43EB3B0}"/>
               </a:ext>
             </a:extLst>
           </p:cNvPr>
@@ -5320,7 +5321,7 @@
           <p:cNvPr id="2" name="Titel 1">
             <a:extLst>
               <a:ext uri="{FF2B5EF4-FFF2-40B4-BE49-F238E27FC236}">
-                <a16:creationId xmlns:a16="http://schemas.microsoft.com/office/drawing/2014/main" xmlns="" id="{5AD4CF47-00CA-9445-818B-86A9FEE94943}"/>
+                <a16:creationId xmlns:a16="http://schemas.microsoft.com/office/drawing/2014/main" id="{5AD4CF47-00CA-9445-818B-86A9FEE94943}"/>
               </a:ext>
             </a:extLst>
           </p:cNvPr>
@@ -5348,7 +5349,7 @@
           <p:cNvPr id="4" name="Rechteck 3">
             <a:extLst>
               <a:ext uri="{FF2B5EF4-FFF2-40B4-BE49-F238E27FC236}">
-                <a16:creationId xmlns:a16="http://schemas.microsoft.com/office/drawing/2014/main" xmlns="" id="{44A91D52-251F-446E-B340-685C4FB6FDB7}"/>
+                <a16:creationId xmlns:a16="http://schemas.microsoft.com/office/drawing/2014/main" id="{44A91D52-251F-446E-B340-685C4FB6FDB7}"/>
               </a:ext>
             </a:extLst>
           </p:cNvPr>
@@ -5438,10 +5439,10 @@
           <p:cNvPr id="12" name="Rectangle 11">
             <a:extLst>
               <a:ext uri="{FF2B5EF4-FFF2-40B4-BE49-F238E27FC236}">
-                <a16:creationId xmlns:a16="http://schemas.microsoft.com/office/drawing/2014/main" xmlns="" id="{EEE96A74-B62B-4642-AB22-7776A5F48CE7}"/>
+                <a16:creationId xmlns:a16="http://schemas.microsoft.com/office/drawing/2014/main" id="{EEE96A74-B62B-4642-AB22-7776A5F48CE7}"/>
               </a:ext>
               <a:ext uri="{C183D7F6-B498-43B3-948B-1728B52AA6E4}">
-                <adec:decorative xmlns:adec="http://schemas.microsoft.com/office/drawing/2017/decorative" xmlns="" val="1"/>
+                <adec:decorative xmlns:adec="http://schemas.microsoft.com/office/drawing/2017/decorative" val="1"/>
               </a:ext>
             </a:extLst>
           </p:cNvPr>
@@ -5451,7 +5452,7 @@
           <p:nvPr>
             <p:extLst>
               <p:ext uri="{386F3935-93C4-4BCD-93E2-E3B085C9AB24}">
-                <p16:designElem xmlns:p16="http://schemas.microsoft.com/office/powerpoint/2015/main" xmlns="" val="1"/>
+                <p16:designElem xmlns:p16="http://schemas.microsoft.com/office/powerpoint/2015/main" val="1"/>
               </p:ext>
             </p:extLst>
           </p:nvPr>
@@ -5514,7 +5515,7 @@
           <p:cNvPr id="2" name="Titel 1">
             <a:extLst>
               <a:ext uri="{FF2B5EF4-FFF2-40B4-BE49-F238E27FC236}">
-                <a16:creationId xmlns:a16="http://schemas.microsoft.com/office/drawing/2014/main" xmlns="" id="{384B6360-9277-3447-9068-3F57EFB83E5E}"/>
+                <a16:creationId xmlns:a16="http://schemas.microsoft.com/office/drawing/2014/main" id="{384B6360-9277-3447-9068-3F57EFB83E5E}"/>
               </a:ext>
             </a:extLst>
           </p:cNvPr>
@@ -5551,10 +5552,10 @@
           <p:cNvPr id="14" name="Straight Connector 13">
             <a:extLst>
               <a:ext uri="{FF2B5EF4-FFF2-40B4-BE49-F238E27FC236}">
-                <a16:creationId xmlns:a16="http://schemas.microsoft.com/office/drawing/2014/main" xmlns="" id="{3A513CAD-9784-4D35-BAF9-1F7DDD697BDB}"/>
+                <a16:creationId xmlns:a16="http://schemas.microsoft.com/office/drawing/2014/main" id="{3A513CAD-9784-4D35-BAF9-1F7DDD697BDB}"/>
               </a:ext>
               <a:ext uri="{C183D7F6-B498-43B3-948B-1728B52AA6E4}">
-                <adec:decorative xmlns:adec="http://schemas.microsoft.com/office/drawing/2017/decorative" xmlns="" val="1"/>
+                <adec:decorative xmlns:adec="http://schemas.microsoft.com/office/drawing/2017/decorative" val="1"/>
               </a:ext>
             </a:extLst>
           </p:cNvPr>
@@ -5564,7 +5565,7 @@
           <p:nvPr>
             <p:extLst>
               <p:ext uri="{386F3935-93C4-4BCD-93E2-E3B085C9AB24}">
-                <p16:designElem xmlns:p16="http://schemas.microsoft.com/office/powerpoint/2015/main" xmlns="" val="1"/>
+                <p16:designElem xmlns:p16="http://schemas.microsoft.com/office/powerpoint/2015/main" val="1"/>
               </p:ext>
             </p:extLst>
           </p:nvPr>
@@ -5603,7 +5604,7 @@
           <p:cNvPr id="9" name="Content Placeholder 8">
             <a:extLst>
               <a:ext uri="{FF2B5EF4-FFF2-40B4-BE49-F238E27FC236}">
-                <a16:creationId xmlns:a16="http://schemas.microsoft.com/office/drawing/2014/main" xmlns="" id="{2BE1C306-7D1A-40C1-961F-4CDDDC3ED232}"/>
+                <a16:creationId xmlns:a16="http://schemas.microsoft.com/office/drawing/2014/main" id="{2BE1C306-7D1A-40C1-961F-4CDDDC3ED232}"/>
               </a:ext>
             </a:extLst>
           </p:cNvPr>
@@ -5638,7 +5639,7 @@
           <p:cNvPr id="5" name="Inhaltsplatzhalter 4" descr="Ein Bild, das Text enthält.&#10;&#10;Automatisch generierte Beschreibung">
             <a:extLst>
               <a:ext uri="{FF2B5EF4-FFF2-40B4-BE49-F238E27FC236}">
-                <a16:creationId xmlns:a16="http://schemas.microsoft.com/office/drawing/2014/main" xmlns="" id="{126B74DA-018B-024D-AB60-08008A951D1C}"/>
+                <a16:creationId xmlns:a16="http://schemas.microsoft.com/office/drawing/2014/main" id="{126B74DA-018B-024D-AB60-08008A951D1C}"/>
               </a:ext>
             </a:extLst>
           </p:cNvPr>
@@ -5668,7 +5669,7 @@
           <p:cNvPr id="8" name="Rechteck 7">
             <a:extLst>
               <a:ext uri="{FF2B5EF4-FFF2-40B4-BE49-F238E27FC236}">
-                <a16:creationId xmlns:a16="http://schemas.microsoft.com/office/drawing/2014/main" xmlns="" id="{3734AF31-0A5F-4E14-964C-3E5364358087}"/>
+                <a16:creationId xmlns:a16="http://schemas.microsoft.com/office/drawing/2014/main" id="{3734AF31-0A5F-4E14-964C-3E5364358087}"/>
               </a:ext>
             </a:extLst>
           </p:cNvPr>
@@ -5758,10 +5759,10 @@
           <p:cNvPr id="16" name="Rectangle 15">
             <a:extLst>
               <a:ext uri="{FF2B5EF4-FFF2-40B4-BE49-F238E27FC236}">
-                <a16:creationId xmlns:a16="http://schemas.microsoft.com/office/drawing/2014/main" xmlns="" id="{B65AA36A-D7CC-493C-A0EE-F8AC3564D17D}"/>
+                <a16:creationId xmlns:a16="http://schemas.microsoft.com/office/drawing/2014/main" id="{B65AA36A-D7CC-493C-A0EE-F8AC3564D17D}"/>
               </a:ext>
               <a:ext uri="{C183D7F6-B498-43B3-948B-1728B52AA6E4}">
-                <adec:decorative xmlns:adec="http://schemas.microsoft.com/office/drawing/2017/decorative" xmlns="" val="1"/>
+                <adec:decorative xmlns:adec="http://schemas.microsoft.com/office/drawing/2017/decorative" val="1"/>
               </a:ext>
             </a:extLst>
           </p:cNvPr>
@@ -5771,7 +5772,7 @@
           <p:nvPr>
             <p:extLst>
               <p:ext uri="{386F3935-93C4-4BCD-93E2-E3B085C9AB24}">
-                <p16:designElem xmlns:p16="http://schemas.microsoft.com/office/powerpoint/2015/main" xmlns="" val="1"/>
+                <p16:designElem xmlns:p16="http://schemas.microsoft.com/office/powerpoint/2015/main" val="1"/>
               </p:ext>
             </p:extLst>
           </p:nvPr>
@@ -5834,7 +5835,7 @@
           <p:cNvPr id="2" name="Titel 1">
             <a:extLst>
               <a:ext uri="{FF2B5EF4-FFF2-40B4-BE49-F238E27FC236}">
-                <a16:creationId xmlns:a16="http://schemas.microsoft.com/office/drawing/2014/main" xmlns="" id="{AA1D0167-D80A-C841-942D-064A5D7A5F0E}"/>
+                <a16:creationId xmlns:a16="http://schemas.microsoft.com/office/drawing/2014/main" id="{AA1D0167-D80A-C841-942D-064A5D7A5F0E}"/>
               </a:ext>
             </a:extLst>
           </p:cNvPr>
@@ -5877,7 +5878,7 @@
           <p:cNvPr id="11" name="Grafik 11">
             <a:extLst>
               <a:ext uri="{FF2B5EF4-FFF2-40B4-BE49-F238E27FC236}">
-                <a16:creationId xmlns:a16="http://schemas.microsoft.com/office/drawing/2014/main" xmlns="" id="{F20A668C-AC99-4CA6-90B4-6859F85C05DA}"/>
+                <a16:creationId xmlns:a16="http://schemas.microsoft.com/office/drawing/2014/main" id="{F20A668C-AC99-4CA6-90B4-6859F85C05DA}"/>
               </a:ext>
             </a:extLst>
           </p:cNvPr>
@@ -5908,10 +5909,10 @@
           <p:cNvPr id="18" name="Straight Connector 17">
             <a:extLst>
               <a:ext uri="{FF2B5EF4-FFF2-40B4-BE49-F238E27FC236}">
-                <a16:creationId xmlns:a16="http://schemas.microsoft.com/office/drawing/2014/main" xmlns="" id="{E1C2E33F-4B1D-4F8B-B721-96313EA29404}"/>
+                <a16:creationId xmlns:a16="http://schemas.microsoft.com/office/drawing/2014/main" id="{E1C2E33F-4B1D-4F8B-B721-96313EA29404}"/>
               </a:ext>
               <a:ext uri="{C183D7F6-B498-43B3-948B-1728B52AA6E4}">
-                <adec:decorative xmlns:adec="http://schemas.microsoft.com/office/drawing/2017/decorative" xmlns="" val="1"/>
+                <adec:decorative xmlns:adec="http://schemas.microsoft.com/office/drawing/2017/decorative" val="1"/>
               </a:ext>
             </a:extLst>
           </p:cNvPr>
@@ -5921,7 +5922,7 @@
           <p:nvPr>
             <p:extLst>
               <p:ext uri="{386F3935-93C4-4BCD-93E2-E3B085C9AB24}">
-                <p16:designElem xmlns:p16="http://schemas.microsoft.com/office/powerpoint/2015/main" xmlns="" val="1"/>
+                <p16:designElem xmlns:p16="http://schemas.microsoft.com/office/powerpoint/2015/main" val="1"/>
               </p:ext>
             </p:extLst>
           </p:nvPr>
@@ -5960,7 +5961,7 @@
           <p:cNvPr id="4" name="Textplatzhalter 3">
             <a:extLst>
               <a:ext uri="{FF2B5EF4-FFF2-40B4-BE49-F238E27FC236}">
-                <a16:creationId xmlns:a16="http://schemas.microsoft.com/office/drawing/2014/main" xmlns="" id="{44E669E2-A9BF-8145-BBFA-68CE84F895AC}"/>
+                <a16:creationId xmlns:a16="http://schemas.microsoft.com/office/drawing/2014/main" id="{44E669E2-A9BF-8145-BBFA-68CE84F895AC}"/>
               </a:ext>
             </a:extLst>
           </p:cNvPr>
@@ -6051,7 +6052,7 @@
           <p:cNvPr id="15" name="Gerade Verbindung mit Pfeil 14">
             <a:extLst>
               <a:ext uri="{FF2B5EF4-FFF2-40B4-BE49-F238E27FC236}">
-                <a16:creationId xmlns:a16="http://schemas.microsoft.com/office/drawing/2014/main" xmlns="" id="{5463A99B-C15B-4A15-98B8-73407C13C065}"/>
+                <a16:creationId xmlns:a16="http://schemas.microsoft.com/office/drawing/2014/main" id="{5463A99B-C15B-4A15-98B8-73407C13C065}"/>
               </a:ext>
             </a:extLst>
           </p:cNvPr>
@@ -6060,7 +6061,7 @@
         </p:nvCxnSpPr>
         <p:spPr>
           <a:xfrm>
-            <a:off x="364041" y="1321187"/>
+            <a:off x="364041" y="1342492"/>
             <a:ext cx="1022194" cy="0"/>
           </a:xfrm>
           <a:prstGeom prst="straightConnector1">
@@ -6092,7 +6093,7 @@
           <p:cNvPr id="19" name="Gerade Verbindung mit Pfeil 18">
             <a:extLst>
               <a:ext uri="{FF2B5EF4-FFF2-40B4-BE49-F238E27FC236}">
-                <a16:creationId xmlns:a16="http://schemas.microsoft.com/office/drawing/2014/main" xmlns="" id="{7482B7B0-1141-45B1-A17B-4FCFA1B4E8DE}"/>
+                <a16:creationId xmlns:a16="http://schemas.microsoft.com/office/drawing/2014/main" id="{7482B7B0-1141-45B1-A17B-4FCFA1B4E8DE}"/>
               </a:ext>
             </a:extLst>
           </p:cNvPr>
@@ -6103,7 +6104,7 @@
         </p:nvCxnSpPr>
         <p:spPr>
           <a:xfrm>
-            <a:off x="3672236" y="1451284"/>
+            <a:off x="3672236" y="1486144"/>
             <a:ext cx="1022194" cy="0"/>
           </a:xfrm>
           <a:prstGeom prst="straightConnector1">
@@ -6165,7 +6166,7 @@
           <p:cNvPr id="2" name="Titel 1">
             <a:extLst>
               <a:ext uri="{FF2B5EF4-FFF2-40B4-BE49-F238E27FC236}">
-                <a16:creationId xmlns:a16="http://schemas.microsoft.com/office/drawing/2014/main" xmlns="" id="{2B85A2D9-0AEF-1F4A-BC44-503082552B47}"/>
+                <a16:creationId xmlns:a16="http://schemas.microsoft.com/office/drawing/2014/main" id="{2B85A2D9-0AEF-1F4A-BC44-503082552B47}"/>
               </a:ext>
             </a:extLst>
           </p:cNvPr>
@@ -6193,7 +6194,7 @@
           <p:cNvPr id="9" name="Inhaltsplatzhalter 8" descr="Ein Bild, das Text enthält.&#10;&#10;Automatisch generierte Beschreibung">
             <a:extLst>
               <a:ext uri="{FF2B5EF4-FFF2-40B4-BE49-F238E27FC236}">
-                <a16:creationId xmlns:a16="http://schemas.microsoft.com/office/drawing/2014/main" xmlns="" id="{14F7B295-EA84-A043-96E9-80A80D4EC2F4}"/>
+                <a16:creationId xmlns:a16="http://schemas.microsoft.com/office/drawing/2014/main" id="{14F7B295-EA84-A043-96E9-80A80D4EC2F4}"/>
               </a:ext>
             </a:extLst>
           </p:cNvPr>
@@ -6217,6 +6218,58 @@
           </a:xfrm>
         </p:spPr>
       </p:pic>
+      <p:sp>
+        <p:nvSpPr>
+          <p:cNvPr id="6" name="Rechteck 5">
+            <a:extLst>
+              <a:ext uri="{FF2B5EF4-FFF2-40B4-BE49-F238E27FC236}">
+                <a16:creationId xmlns:a16="http://schemas.microsoft.com/office/drawing/2014/main" id="{A107A47C-7FFA-4FFC-9A2C-4324336776D6}"/>
+              </a:ext>
+            </a:extLst>
+          </p:cNvPr>
+          <p:cNvSpPr/>
+          <p:nvPr/>
+        </p:nvSpPr>
+        <p:spPr>
+          <a:xfrm>
+            <a:off x="1384184" y="2999796"/>
+            <a:ext cx="7298422" cy="280299"/>
+          </a:xfrm>
+          <a:prstGeom prst="rect">
+            <a:avLst/>
+          </a:prstGeom>
+          <a:noFill/>
+          <a:ln>
+            <a:solidFill>
+              <a:srgbClr val="FF0000"/>
+            </a:solidFill>
+          </a:ln>
+        </p:spPr>
+        <p:style>
+          <a:lnRef idx="2">
+            <a:schemeClr val="accent1">
+              <a:shade val="50000"/>
+            </a:schemeClr>
+          </a:lnRef>
+          <a:fillRef idx="1">
+            <a:schemeClr val="accent1"/>
+          </a:fillRef>
+          <a:effectRef idx="0">
+            <a:schemeClr val="accent1"/>
+          </a:effectRef>
+          <a:fontRef idx="minor">
+            <a:schemeClr val="lt1"/>
+          </a:fontRef>
+        </p:style>
+        <p:txBody>
+          <a:bodyPr rtlCol="0" anchor="ctr"/>
+          <a:lstStyle/>
+          <a:p>
+            <a:pPr algn="ctr"/>
+            <a:endParaRPr lang="de-DE"/>
+          </a:p>
+        </p:txBody>
+      </p:sp>
     </p:spTree>
     <p:extLst>
       <p:ext uri="{BB962C8B-B14F-4D97-AF65-F5344CB8AC3E}">
@@ -6252,7 +6305,7 @@
           <p:cNvPr id="2" name="Titel 1">
             <a:extLst>
               <a:ext uri="{FF2B5EF4-FFF2-40B4-BE49-F238E27FC236}">
-                <a16:creationId xmlns:a16="http://schemas.microsoft.com/office/drawing/2014/main" xmlns="" id="{4BD865C4-519C-404E-B8E6-435095E83D98}"/>
+                <a16:creationId xmlns:a16="http://schemas.microsoft.com/office/drawing/2014/main" id="{2B85A2D9-0AEF-1F4A-BC44-503082552B47}"/>
               </a:ext>
             </a:extLst>
           </p:cNvPr>
@@ -6270,55 +6323,53 @@
           <a:p>
             <a:r>
               <a:rPr lang="de-DE" dirty="0"/>
-              <a:t>Unser Bonus / Tests</a:t>
+              <a:t>Code Auszug: OP</a:t>
             </a:r>
           </a:p>
         </p:txBody>
       </p:sp>
       <p:pic>
         <p:nvPicPr>
-          <p:cNvPr id="14" name="Grafik 14" descr="Ein Bild, das Text enthält.&#10;&#10;Beschreibung automatisch generiert.">
-            <a:extLst>
-              <a:ext uri="{FF2B5EF4-FFF2-40B4-BE49-F238E27FC236}">
-                <a16:creationId xmlns:a16="http://schemas.microsoft.com/office/drawing/2014/main" xmlns="" id="{C4605A8A-526E-4466-8374-32B227294DCC}"/>
+          <p:cNvPr id="7" name="Grafik 6">
+            <a:extLst>
+              <a:ext uri="{FF2B5EF4-FFF2-40B4-BE49-F238E27FC236}">
+                <a16:creationId xmlns:a16="http://schemas.microsoft.com/office/drawing/2014/main" id="{D3A32CB9-C865-407A-A43D-756FA7BF3EFF}"/>
               </a:ext>
             </a:extLst>
           </p:cNvPr>
           <p:cNvPicPr>
-            <a:picLocks noGrp="1" noChangeAspect="1"/>
+            <a:picLocks noChangeAspect="1"/>
           </p:cNvPicPr>
-          <p:nvPr>
-            <p:ph sz="half" idx="2"/>
-          </p:nvPr>
+          <p:nvPr/>
         </p:nvPicPr>
-        <p:blipFill>
+        <p:blipFill rotWithShape="1">
           <a:blip r:embed="rId2"/>
-          <a:stretch>
-            <a:fillRect/>
-          </a:stretch>
+          <a:srcRect r="34512"/>
+          <a:stretch/>
         </p:blipFill>
         <p:spPr>
           <a:xfrm>
-            <a:off x="6580861" y="3107488"/>
-            <a:ext cx="4928400" cy="1305206"/>
+            <a:off x="989399" y="4544391"/>
+            <a:ext cx="5820587" cy="1371791"/>
           </a:xfrm>
+          <a:prstGeom prst="rect">
+            <a:avLst/>
+          </a:prstGeom>
         </p:spPr>
       </p:pic>
       <p:pic>
         <p:nvPicPr>
-          <p:cNvPr id="15" name="Grafik 15" descr="Ein Bild, das Text enthält.&#10;&#10;Beschreibung automatisch generiert.">
-            <a:extLst>
-              <a:ext uri="{FF2B5EF4-FFF2-40B4-BE49-F238E27FC236}">
-                <a16:creationId xmlns:a16="http://schemas.microsoft.com/office/drawing/2014/main" xmlns="" id="{3879710E-38C1-4F72-B1FB-953198AD5D74}"/>
+          <p:cNvPr id="10" name="Grafik 9">
+            <a:extLst>
+              <a:ext uri="{FF2B5EF4-FFF2-40B4-BE49-F238E27FC236}">
+                <a16:creationId xmlns:a16="http://schemas.microsoft.com/office/drawing/2014/main" id="{4E525B54-2783-4B2D-AC4E-DD5FEDD4343A}"/>
               </a:ext>
             </a:extLst>
           </p:cNvPr>
           <p:cNvPicPr>
-            <a:picLocks noGrp="1" noChangeAspect="1"/>
+            <a:picLocks noChangeAspect="1"/>
           </p:cNvPicPr>
-          <p:nvPr>
-            <p:ph sz="half" idx="1"/>
-          </p:nvPr>
+          <p:nvPr/>
         </p:nvPicPr>
         <p:blipFill>
           <a:blip r:embed="rId3"/>
@@ -6328,15 +6379,109 @@
         </p:blipFill>
         <p:spPr>
           <a:xfrm>
-            <a:off x="989400" y="1982750"/>
-            <a:ext cx="5467375" cy="3879925"/>
+            <a:off x="989400" y="2528762"/>
+            <a:ext cx="5820587" cy="1800476"/>
           </a:xfrm>
+          <a:prstGeom prst="rect">
+            <a:avLst/>
+          </a:prstGeom>
         </p:spPr>
       </p:pic>
+      <p:pic>
+        <p:nvPicPr>
+          <p:cNvPr id="12" name="Grafik 11">
+            <a:extLst>
+              <a:ext uri="{FF2B5EF4-FFF2-40B4-BE49-F238E27FC236}">
+                <a16:creationId xmlns:a16="http://schemas.microsoft.com/office/drawing/2014/main" id="{E6B717EF-C8DB-4B27-80A2-25E032C119B1}"/>
+              </a:ext>
+            </a:extLst>
+          </p:cNvPr>
+          <p:cNvPicPr>
+            <a:picLocks noChangeAspect="1"/>
+          </p:cNvPicPr>
+          <p:nvPr/>
+        </p:nvPicPr>
+        <p:blipFill>
+          <a:blip r:embed="rId4"/>
+          <a:stretch>
+            <a:fillRect/>
+          </a:stretch>
+        </p:blipFill>
+        <p:spPr>
+          <a:xfrm>
+            <a:off x="989400" y="2125318"/>
+            <a:ext cx="5820586" cy="223511"/>
+          </a:xfrm>
+          <a:prstGeom prst="rect">
+            <a:avLst/>
+          </a:prstGeom>
+        </p:spPr>
+      </p:pic>
+      <p:sp>
+        <p:nvSpPr>
+          <p:cNvPr id="13" name="Textfeld 12">
+            <a:extLst>
+              <a:ext uri="{FF2B5EF4-FFF2-40B4-BE49-F238E27FC236}">
+                <a16:creationId xmlns:a16="http://schemas.microsoft.com/office/drawing/2014/main" id="{2F850AA6-F8F0-4A78-ACE4-987EE18EDD29}"/>
+              </a:ext>
+            </a:extLst>
+          </p:cNvPr>
+          <p:cNvSpPr txBox="1"/>
+          <p:nvPr/>
+        </p:nvSpPr>
+        <p:spPr>
+          <a:xfrm>
+            <a:off x="2429437" y="2927355"/>
+            <a:ext cx="2438400" cy="338554"/>
+          </a:xfrm>
+          <a:prstGeom prst="rect">
+            <a:avLst/>
+          </a:prstGeom>
+          <a:noFill/>
+        </p:spPr>
+        <p:txBody>
+          <a:bodyPr wrap="square" rtlCol="0">
+            <a:spAutoFit/>
+          </a:bodyPr>
+          <a:lstStyle/>
+          <a:p>
+            <a:r>
+              <a:rPr lang="de-DE" sz="1600" dirty="0">
+                <a:solidFill>
+                  <a:srgbClr val="506E51"/>
+                </a:solidFill>
+                <a:latin typeface="Arial" panose="020B0604020202020204" pitchFamily="34" charset="0"/>
+                <a:cs typeface="Arial" panose="020B0604020202020204" pitchFamily="34" charset="0"/>
+              </a:rPr>
+              <a:t>“</a:t>
+            </a:r>
+            <a:r>
+              <a:rPr lang="de-DE" sz="1600" dirty="0" err="1">
+                <a:solidFill>
+                  <a:srgbClr val="506E51"/>
+                </a:solidFill>
+                <a:latin typeface="Arial" panose="020B0604020202020204" pitchFamily="34" charset="0"/>
+                <a:cs typeface="Arial" panose="020B0604020202020204" pitchFamily="34" charset="0"/>
+              </a:rPr>
+              <a:t>who</a:t>
+            </a:r>
+            <a:r>
+              <a:rPr lang="de-DE" sz="1600" dirty="0">
+                <a:solidFill>
+                  <a:srgbClr val="506E51"/>
+                </a:solidFill>
+                <a:latin typeface="Arial" panose="020B0604020202020204" pitchFamily="34" charset="0"/>
+                <a:cs typeface="Arial" panose="020B0604020202020204" pitchFamily="34" charset="0"/>
+              </a:rPr>
+              <a:t> &gt; me.txt 2&gt;&amp;1“</a:t>
+            </a:r>
+          </a:p>
+        </p:txBody>
+      </p:sp>
     </p:spTree>
     <p:extLst>
       <p:ext uri="{BB962C8B-B14F-4D97-AF65-F5344CB8AC3E}">
-        <p14:creationId xmlns:p14="http://schemas.microsoft.com/office/powerpoint/2010/main" val="2134562111"/>
+        <p14:creationId xmlns:p14="http://schemas.microsoft.com/office/powerpoint/2010/main" val="2129865493"/>
       </p:ext>
     </p:extLst>
   </p:cSld>
@@ -6368,7 +6513,100 @@
           <p:cNvPr id="2" name="Titel 1">
             <a:extLst>
               <a:ext uri="{FF2B5EF4-FFF2-40B4-BE49-F238E27FC236}">
-                <a16:creationId xmlns:a16="http://schemas.microsoft.com/office/drawing/2014/main" xmlns="" id="{F268A1AC-98ED-8043-8EE4-7B536D365BF2}"/>
+                <a16:creationId xmlns:a16="http://schemas.microsoft.com/office/drawing/2014/main" id="{4BD865C4-519C-404E-B8E6-435095E83D98}"/>
+              </a:ext>
+            </a:extLst>
+          </p:cNvPr>
+          <p:cNvSpPr>
+            <a:spLocks noGrp="1"/>
+          </p:cNvSpPr>
+          <p:nvPr>
+            <p:ph type="title"/>
+          </p:nvPr>
+        </p:nvSpPr>
+        <p:spPr/>
+        <p:txBody>
+          <a:bodyPr/>
+          <a:lstStyle/>
+          <a:p>
+            <a:r>
+              <a:rPr lang="de-DE" dirty="0"/>
+              <a:t>Eigene </a:t>
+            </a:r>
+            <a:r>
+              <a:rPr lang="de-DE" dirty="0" err="1"/>
+              <a:t>UnitTests</a:t>
+            </a:r>
+            <a:endParaRPr lang="de-DE" dirty="0"/>
+          </a:p>
+        </p:txBody>
+      </p:sp>
+      <p:pic>
+        <p:nvPicPr>
+          <p:cNvPr id="6" name="Grafik 5">
+            <a:extLst>
+              <a:ext uri="{FF2B5EF4-FFF2-40B4-BE49-F238E27FC236}">
+                <a16:creationId xmlns:a16="http://schemas.microsoft.com/office/drawing/2014/main" id="{5190D742-9F92-4963-BE21-E9BC20B230D5}"/>
+              </a:ext>
+            </a:extLst>
+          </p:cNvPr>
+          <p:cNvPicPr>
+            <a:picLocks noChangeAspect="1"/>
+          </p:cNvPicPr>
+          <p:nvPr/>
+        </p:nvPicPr>
+        <p:blipFill>
+          <a:blip r:embed="rId2"/>
+          <a:stretch>
+            <a:fillRect/>
+          </a:stretch>
+        </p:blipFill>
+        <p:spPr>
+          <a:xfrm>
+            <a:off x="989400" y="1837764"/>
+            <a:ext cx="6047894" cy="3342600"/>
+          </a:xfrm>
+          <a:prstGeom prst="rect">
+            <a:avLst/>
+          </a:prstGeom>
+        </p:spPr>
+      </p:pic>
+    </p:spTree>
+    <p:extLst>
+      <p:ext uri="{BB962C8B-B14F-4D97-AF65-F5344CB8AC3E}">
+        <p14:creationId xmlns:p14="http://schemas.microsoft.com/office/powerpoint/2010/main" val="2134562111"/>
+      </p:ext>
+    </p:extLst>
+  </p:cSld>
+  <p:clrMapOvr>
+    <a:masterClrMapping/>
+  </p:clrMapOvr>
+</p:sld>
+</file>
+
+<file path=ppt/slides/slide19.xml><?xml version="1.0" encoding="utf-8"?>
+<p:sld xmlns:a="http://schemas.openxmlformats.org/drawingml/2006/main" xmlns:r="http://schemas.openxmlformats.org/officeDocument/2006/relationships" xmlns:p="http://schemas.openxmlformats.org/presentationml/2006/main">
+  <p:cSld>
+    <p:spTree>
+      <p:nvGrpSpPr>
+        <p:cNvPr id="1" name=""/>
+        <p:cNvGrpSpPr/>
+        <p:nvPr/>
+      </p:nvGrpSpPr>
+      <p:grpSpPr>
+        <a:xfrm>
+          <a:off x="0" y="0"/>
+          <a:ext cx="0" cy="0"/>
+          <a:chOff x="0" y="0"/>
+          <a:chExt cx="0" cy="0"/>
+        </a:xfrm>
+      </p:grpSpPr>
+      <p:sp>
+        <p:nvSpPr>
+          <p:cNvPr id="2" name="Titel 1">
+            <a:extLst>
+              <a:ext uri="{FF2B5EF4-FFF2-40B4-BE49-F238E27FC236}">
+                <a16:creationId xmlns:a16="http://schemas.microsoft.com/office/drawing/2014/main" id="{F268A1AC-98ED-8043-8EE4-7B536D365BF2}"/>
               </a:ext>
             </a:extLst>
           </p:cNvPr>
@@ -6434,10 +6672,10 @@
           <p:cNvPr id="8" name="Straight Connector 7">
             <a:extLst>
               <a:ext uri="{FF2B5EF4-FFF2-40B4-BE49-F238E27FC236}">
-                <a16:creationId xmlns:a16="http://schemas.microsoft.com/office/drawing/2014/main" xmlns="" id="{AE0C0B2A-3FD1-4235-A16E-0ED1E028A93E}"/>
+                <a16:creationId xmlns:a16="http://schemas.microsoft.com/office/drawing/2014/main" id="{AE0C0B2A-3FD1-4235-A16E-0ED1E028A93E}"/>
               </a:ext>
               <a:ext uri="{C183D7F6-B498-43B3-948B-1728B52AA6E4}">
-                <adec:decorative xmlns:adec="http://schemas.microsoft.com/office/drawing/2017/decorative" xmlns="" val="1"/>
+                <adec:decorative xmlns:adec="http://schemas.microsoft.com/office/drawing/2017/decorative" val="1"/>
               </a:ext>
             </a:extLst>
           </p:cNvPr>
@@ -6447,7 +6685,7 @@
           <p:nvPr>
             <p:extLst>
               <p:ext uri="{386F3935-93C4-4BCD-93E2-E3B085C9AB24}">
-                <p16:designElem xmlns:p16="http://schemas.microsoft.com/office/powerpoint/2015/main" xmlns="" val="1"/>
+                <p16:designElem xmlns:p16="http://schemas.microsoft.com/office/powerpoint/2015/main" val="1"/>
               </p:ext>
             </p:extLst>
           </p:nvPr>
@@ -6486,10 +6724,10 @@
           <p:cNvPr id="10" name="Group 9">
             <a:extLst>
               <a:ext uri="{FF2B5EF4-FFF2-40B4-BE49-F238E27FC236}">
-                <a16:creationId xmlns:a16="http://schemas.microsoft.com/office/drawing/2014/main" xmlns="" id="{9494E066-0146-46E9-BAF1-C33240ABA294}"/>
+                <a16:creationId xmlns:a16="http://schemas.microsoft.com/office/drawing/2014/main" id="{9494E066-0146-46E9-BAF1-C33240ABA294}"/>
               </a:ext>
               <a:ext uri="{C183D7F6-B498-43B3-948B-1728B52AA6E4}">
-                <adec:decorative xmlns:adec="http://schemas.microsoft.com/office/drawing/2017/decorative" xmlns="" val="1"/>
+                <adec:decorative xmlns:adec="http://schemas.microsoft.com/office/drawing/2017/decorative" val="1"/>
               </a:ext>
             </a:extLst>
           </p:cNvPr>
@@ -6499,7 +6737,7 @@
           <p:nvPr>
             <p:extLst>
               <p:ext uri="{386F3935-93C4-4BCD-93E2-E3B085C9AB24}">
-                <p16:designElem xmlns:p16="http://schemas.microsoft.com/office/powerpoint/2015/main" xmlns="" val="1"/>
+                <p16:designElem xmlns:p16="http://schemas.microsoft.com/office/powerpoint/2015/main" val="1"/>
               </p:ext>
             </p:extLst>
           </p:nvPr>
@@ -6517,10 +6755,10 @@
             <p:cNvPr id="11" name="Group 10">
               <a:extLst>
                 <a:ext uri="{FF2B5EF4-FFF2-40B4-BE49-F238E27FC236}">
-                  <a16:creationId xmlns:a16="http://schemas.microsoft.com/office/drawing/2014/main" xmlns="" id="{B02BD80B-C499-4DAC-9580-575B04F8658F}"/>
+                  <a16:creationId xmlns:a16="http://schemas.microsoft.com/office/drawing/2014/main" id="{B02BD80B-C499-4DAC-9580-575B04F8658F}"/>
                 </a:ext>
                 <a:ext uri="{C183D7F6-B498-43B3-948B-1728B52AA6E4}">
-                  <adec:decorative xmlns:adec="http://schemas.microsoft.com/office/drawing/2017/decorative" xmlns="" val="1"/>
+                  <adec:decorative xmlns:adec="http://schemas.microsoft.com/office/drawing/2017/decorative" val="1"/>
                 </a:ext>
               </a:extLst>
             </p:cNvPr>
@@ -6528,7 +6766,7 @@
             <p:nvPr>
               <p:extLst>
                 <p:ext uri="{386F3935-93C4-4BCD-93E2-E3B085C9AB24}">
-                  <p16:designElem xmlns:p16="http://schemas.microsoft.com/office/powerpoint/2015/main" xmlns="" val="1"/>
+                  <p16:designElem xmlns:p16="http://schemas.microsoft.com/office/powerpoint/2015/main" val="1"/>
                 </p:ext>
               </p:extLst>
             </p:nvPr>
@@ -6546,10 +6784,10 @@
               <p:cNvPr id="13" name="Freeform 68">
                 <a:extLst>
                   <a:ext uri="{FF2B5EF4-FFF2-40B4-BE49-F238E27FC236}">
-                    <a16:creationId xmlns:a16="http://schemas.microsoft.com/office/drawing/2014/main" xmlns="" id="{CCF069F3-858C-4C67-90C2-46017C3D4CEB}"/>
+                    <a16:creationId xmlns:a16="http://schemas.microsoft.com/office/drawing/2014/main" id="{CCF069F3-858C-4C67-90C2-46017C3D4CEB}"/>
                   </a:ext>
                   <a:ext uri="{C183D7F6-B498-43B3-948B-1728B52AA6E4}">
-                    <adec:decorative xmlns:adec="http://schemas.microsoft.com/office/drawing/2017/decorative" xmlns="" val="1"/>
+                    <adec:decorative xmlns:adec="http://schemas.microsoft.com/office/drawing/2017/decorative" val="1"/>
                   </a:ext>
                 </a:extLst>
               </p:cNvPr>
@@ -6559,7 +6797,7 @@
               <p:nvPr>
                 <p:extLst>
                   <p:ext uri="{386F3935-93C4-4BCD-93E2-E3B085C9AB24}">
-                    <p16:designElem xmlns:p16="http://schemas.microsoft.com/office/powerpoint/2015/main" xmlns="" val="1"/>
+                    <p16:designElem xmlns:p16="http://schemas.microsoft.com/office/powerpoint/2015/main" val="1"/>
                   </p:ext>
                 </p:extLst>
               </p:nvPr>
@@ -6658,10 +6896,10 @@
               <p:cNvPr id="14" name="Freeform 69">
                 <a:extLst>
                   <a:ext uri="{FF2B5EF4-FFF2-40B4-BE49-F238E27FC236}">
-                    <a16:creationId xmlns:a16="http://schemas.microsoft.com/office/drawing/2014/main" xmlns="" id="{8A1FFA52-DFA8-4A81-8A85-50BE13257F51}"/>
+                    <a16:creationId xmlns:a16="http://schemas.microsoft.com/office/drawing/2014/main" id="{8A1FFA52-DFA8-4A81-8A85-50BE13257F51}"/>
                   </a:ext>
                   <a:ext uri="{C183D7F6-B498-43B3-948B-1728B52AA6E4}">
-                    <adec:decorative xmlns:adec="http://schemas.microsoft.com/office/drawing/2017/decorative" xmlns="" val="1"/>
+                    <adec:decorative xmlns:adec="http://schemas.microsoft.com/office/drawing/2017/decorative" val="1"/>
                   </a:ext>
                 </a:extLst>
               </p:cNvPr>
@@ -6671,7 +6909,7 @@
               <p:nvPr>
                 <p:extLst>
                   <p:ext uri="{386F3935-93C4-4BCD-93E2-E3B085C9AB24}">
-                    <p16:designElem xmlns:p16="http://schemas.microsoft.com/office/powerpoint/2015/main" xmlns="" val="1"/>
+                    <p16:designElem xmlns:p16="http://schemas.microsoft.com/office/powerpoint/2015/main" val="1"/>
                   </p:ext>
                 </p:extLst>
               </p:nvPr>
@@ -6771,10 +7009,10 @@
             <p:cNvPr id="12" name="Line 70">
               <a:extLst>
                 <a:ext uri="{FF2B5EF4-FFF2-40B4-BE49-F238E27FC236}">
-                  <a16:creationId xmlns:a16="http://schemas.microsoft.com/office/drawing/2014/main" xmlns="" id="{BAEDA471-60CB-4A0C-B9AD-B2B3C51EA2FD}"/>
+                  <a16:creationId xmlns:a16="http://schemas.microsoft.com/office/drawing/2014/main" id="{BAEDA471-60CB-4A0C-B9AD-B2B3C51EA2FD}"/>
                 </a:ext>
                 <a:ext uri="{C183D7F6-B498-43B3-948B-1728B52AA6E4}">
-                  <adec:decorative xmlns:adec="http://schemas.microsoft.com/office/drawing/2017/decorative" xmlns="" val="1"/>
+                  <adec:decorative xmlns:adec="http://schemas.microsoft.com/office/drawing/2017/decorative" val="1"/>
                 </a:ext>
               </a:extLst>
             </p:cNvPr>
@@ -6784,7 +7022,7 @@
             <p:nvPr>
               <p:extLst>
                 <p:ext uri="{386F3935-93C4-4BCD-93E2-E3B085C9AB24}">
-                  <p16:designElem xmlns:p16="http://schemas.microsoft.com/office/powerpoint/2015/main" xmlns="" val="1"/>
+                  <p16:designElem xmlns:p16="http://schemas.microsoft.com/office/powerpoint/2015/main" val="1"/>
                 </p:ext>
               </p:extLst>
             </p:nvPr>
@@ -6835,10 +7073,10 @@
           <p:cNvPr id="16" name="Rectangle 15">
             <a:extLst>
               <a:ext uri="{FF2B5EF4-FFF2-40B4-BE49-F238E27FC236}">
-                <a16:creationId xmlns:a16="http://schemas.microsoft.com/office/drawing/2014/main" xmlns="" id="{3011B0B3-5679-4759-90B8-3B908C4CBD21}"/>
+                <a16:creationId xmlns:a16="http://schemas.microsoft.com/office/drawing/2014/main" id="{3011B0B3-5679-4759-90B8-3B908C4CBD21}"/>
               </a:ext>
               <a:ext uri="{C183D7F6-B498-43B3-948B-1728B52AA6E4}">
-                <adec:decorative xmlns:adec="http://schemas.microsoft.com/office/drawing/2017/decorative" xmlns="" val="1"/>
+                <adec:decorative xmlns:adec="http://schemas.microsoft.com/office/drawing/2017/decorative" val="1"/>
               </a:ext>
             </a:extLst>
           </p:cNvPr>
@@ -6848,7 +7086,7 @@
           <p:nvPr>
             <p:extLst>
               <p:ext uri="{386F3935-93C4-4BCD-93E2-E3B085C9AB24}">
-                <p16:designElem xmlns:p16="http://schemas.microsoft.com/office/powerpoint/2015/main" xmlns="" val="1"/>
+                <p16:designElem xmlns:p16="http://schemas.microsoft.com/office/powerpoint/2015/main" val="1"/>
               </p:ext>
             </p:extLst>
           </p:nvPr>
@@ -6911,7 +7149,7 @@
           <p:cNvPr id="2" name="Titel 1">
             <a:extLst>
               <a:ext uri="{FF2B5EF4-FFF2-40B4-BE49-F238E27FC236}">
-                <a16:creationId xmlns:a16="http://schemas.microsoft.com/office/drawing/2014/main" xmlns="" id="{E98AEE71-400F-144C-A30E-266D4D3588FF}"/>
+                <a16:creationId xmlns:a16="http://schemas.microsoft.com/office/drawing/2014/main" id="{E98AEE71-400F-144C-A30E-266D4D3588FF}"/>
               </a:ext>
             </a:extLst>
           </p:cNvPr>
@@ -6967,7 +7205,7 @@
           <p:cNvPr id="3" name="Inhaltsplatzhalter 2">
             <a:extLst>
               <a:ext uri="{FF2B5EF4-FFF2-40B4-BE49-F238E27FC236}">
-                <a16:creationId xmlns:a16="http://schemas.microsoft.com/office/drawing/2014/main" xmlns="" id="{66F6E6E4-7947-E645-A6C0-9E108F73C805}"/>
+                <a16:creationId xmlns:a16="http://schemas.microsoft.com/office/drawing/2014/main" id="{66F6E6E4-7947-E645-A6C0-9E108F73C805}"/>
               </a:ext>
             </a:extLst>
           </p:cNvPr>
@@ -7045,10 +7283,10 @@
           <p:cNvPr id="18" name="Straight Connector 17">
             <a:extLst>
               <a:ext uri="{FF2B5EF4-FFF2-40B4-BE49-F238E27FC236}">
-                <a16:creationId xmlns:a16="http://schemas.microsoft.com/office/drawing/2014/main" xmlns="" id="{32E97E5C-7A5F-424E-AAE4-654396E90799}"/>
+                <a16:creationId xmlns:a16="http://schemas.microsoft.com/office/drawing/2014/main" id="{32E97E5C-7A5F-424E-AAE4-654396E90799}"/>
               </a:ext>
               <a:ext uri="{C183D7F6-B498-43B3-948B-1728B52AA6E4}">
-                <adec:decorative xmlns:adec="http://schemas.microsoft.com/office/drawing/2017/decorative" xmlns="" val="1"/>
+                <adec:decorative xmlns:adec="http://schemas.microsoft.com/office/drawing/2017/decorative" val="1"/>
               </a:ext>
             </a:extLst>
           </p:cNvPr>
@@ -7058,7 +7296,7 @@
           <p:nvPr>
             <p:extLst>
               <p:ext uri="{386F3935-93C4-4BCD-93E2-E3B085C9AB24}">
-                <p16:designElem xmlns:p16="http://schemas.microsoft.com/office/powerpoint/2015/main" xmlns="" val="1"/>
+                <p16:designElem xmlns:p16="http://schemas.microsoft.com/office/powerpoint/2015/main" val="1"/>
               </p:ext>
             </p:extLst>
           </p:nvPr>
@@ -7097,7 +7335,7 @@
           <p:cNvPr id="15" name="Textfeld 14">
             <a:extLst>
               <a:ext uri="{FF2B5EF4-FFF2-40B4-BE49-F238E27FC236}">
-                <a16:creationId xmlns:a16="http://schemas.microsoft.com/office/drawing/2014/main" xmlns="" id="{A4037804-E404-4EA7-820A-21661C22C7D6}"/>
+                <a16:creationId xmlns:a16="http://schemas.microsoft.com/office/drawing/2014/main" id="{A4037804-E404-4EA7-820A-21661C22C7D6}"/>
               </a:ext>
             </a:extLst>
           </p:cNvPr>
@@ -7166,7 +7404,7 @@
           <p:cNvPr id="2" name="Titel 1">
             <a:extLst>
               <a:ext uri="{FF2B5EF4-FFF2-40B4-BE49-F238E27FC236}">
-                <a16:creationId xmlns:a16="http://schemas.microsoft.com/office/drawing/2014/main" xmlns="" id="{4AE5DA6E-B400-46C5-892F-A89C8BEB2A1B}"/>
+                <a16:creationId xmlns:a16="http://schemas.microsoft.com/office/drawing/2014/main" id="{4AE5DA6E-B400-46C5-892F-A89C8BEB2A1B}"/>
               </a:ext>
             </a:extLst>
           </p:cNvPr>
@@ -7194,7 +7432,7 @@
           <p:cNvPr id="7" name="Grafik 7">
             <a:extLst>
               <a:ext uri="{FF2B5EF4-FFF2-40B4-BE49-F238E27FC236}">
-                <a16:creationId xmlns:a16="http://schemas.microsoft.com/office/drawing/2014/main" xmlns="" id="{2DBE2CE6-08C9-4226-A3DB-F0C8BB5C6AE8}"/>
+                <a16:creationId xmlns:a16="http://schemas.microsoft.com/office/drawing/2014/main" id="{2DBE2CE6-08C9-4226-A3DB-F0C8BB5C6AE8}"/>
               </a:ext>
             </a:extLst>
           </p:cNvPr>
@@ -7253,7 +7491,7 @@
           <p:cNvPr id="2" name="Titel 1">
             <a:extLst>
               <a:ext uri="{FF2B5EF4-FFF2-40B4-BE49-F238E27FC236}">
-                <a16:creationId xmlns:a16="http://schemas.microsoft.com/office/drawing/2014/main" xmlns="" id="{A302A36A-CED2-4996-B906-4615148A74EC}"/>
+                <a16:creationId xmlns:a16="http://schemas.microsoft.com/office/drawing/2014/main" id="{A302A36A-CED2-4996-B906-4615148A74EC}"/>
               </a:ext>
             </a:extLst>
           </p:cNvPr>
@@ -7281,7 +7519,7 @@
           <p:cNvPr id="4" name="Grafik 4">
             <a:extLst>
               <a:ext uri="{FF2B5EF4-FFF2-40B4-BE49-F238E27FC236}">
-                <a16:creationId xmlns:a16="http://schemas.microsoft.com/office/drawing/2014/main" xmlns="" id="{66E01AC0-4CB1-4A3E-8A5E-B9C65D2EFBB3}"/>
+                <a16:creationId xmlns:a16="http://schemas.microsoft.com/office/drawing/2014/main" id="{66E01AC0-4CB1-4A3E-8A5E-B9C65D2EFBB3}"/>
               </a:ext>
             </a:extLst>
           </p:cNvPr>
@@ -7340,7 +7578,7 @@
           <p:cNvPr id="4" name="Titel 3">
             <a:extLst>
               <a:ext uri="{FF2B5EF4-FFF2-40B4-BE49-F238E27FC236}">
-                <a16:creationId xmlns:a16="http://schemas.microsoft.com/office/drawing/2014/main" xmlns="" id="{A221EA1B-FE98-B844-82AB-B11210642292}"/>
+                <a16:creationId xmlns:a16="http://schemas.microsoft.com/office/drawing/2014/main" id="{A221EA1B-FE98-B844-82AB-B11210642292}"/>
               </a:ext>
             </a:extLst>
           </p:cNvPr>
@@ -7403,7 +7641,7 @@
           <p:cNvPr id="2" name="Titel 1">
             <a:extLst>
               <a:ext uri="{FF2B5EF4-FFF2-40B4-BE49-F238E27FC236}">
-                <a16:creationId xmlns:a16="http://schemas.microsoft.com/office/drawing/2014/main" xmlns="" id="{AEB5091C-BE97-D649-8F09-0255843A386B}"/>
+                <a16:creationId xmlns:a16="http://schemas.microsoft.com/office/drawing/2014/main" id="{AEB5091C-BE97-D649-8F09-0255843A386B}"/>
               </a:ext>
             </a:extLst>
           </p:cNvPr>
@@ -7431,7 +7669,7 @@
           <p:cNvPr id="4" name="Inhaltsplatzhalter 3">
             <a:extLst>
               <a:ext uri="{FF2B5EF4-FFF2-40B4-BE49-F238E27FC236}">
-                <a16:creationId xmlns:a16="http://schemas.microsoft.com/office/drawing/2014/main" xmlns="" id="{E6159A98-6B24-8749-8C96-21C2A87BD0F7}"/>
+                <a16:creationId xmlns:a16="http://schemas.microsoft.com/office/drawing/2014/main" id="{E6159A98-6B24-8749-8C96-21C2A87BD0F7}"/>
               </a:ext>
             </a:extLst>
           </p:cNvPr>
@@ -7529,7 +7767,7 @@
           <p:cNvPr id="2" name="Titel 1">
             <a:extLst>
               <a:ext uri="{FF2B5EF4-FFF2-40B4-BE49-F238E27FC236}">
-                <a16:creationId xmlns:a16="http://schemas.microsoft.com/office/drawing/2014/main" xmlns="" id="{ADAC0203-7BC8-0A42-8F30-4C382DA3C118}"/>
+                <a16:creationId xmlns:a16="http://schemas.microsoft.com/office/drawing/2014/main" id="{ADAC0203-7BC8-0A42-8F30-4C382DA3C118}"/>
               </a:ext>
             </a:extLst>
           </p:cNvPr>
@@ -7557,7 +7795,7 @@
           <p:cNvPr id="4" name="Textplatzhalter 3">
             <a:extLst>
               <a:ext uri="{FF2B5EF4-FFF2-40B4-BE49-F238E27FC236}">
-                <a16:creationId xmlns:a16="http://schemas.microsoft.com/office/drawing/2014/main" xmlns="" id="{27C0BFFE-83B8-2144-8B81-0FF7FB577F9A}"/>
+                <a16:creationId xmlns:a16="http://schemas.microsoft.com/office/drawing/2014/main" id="{27C0BFFE-83B8-2144-8B81-0FF7FB577F9A}"/>
               </a:ext>
             </a:extLst>
           </p:cNvPr>
@@ -7585,7 +7823,7 @@
           <p:cNvPr id="6" name="Textplatzhalter 5">
             <a:extLst>
               <a:ext uri="{FF2B5EF4-FFF2-40B4-BE49-F238E27FC236}">
-                <a16:creationId xmlns:a16="http://schemas.microsoft.com/office/drawing/2014/main" xmlns="" id="{49D18E51-7D45-8948-A678-5A1D8FF6D5C5}"/>
+                <a16:creationId xmlns:a16="http://schemas.microsoft.com/office/drawing/2014/main" id="{49D18E51-7D45-8948-A678-5A1D8FF6D5C5}"/>
               </a:ext>
             </a:extLst>
           </p:cNvPr>
@@ -7613,7 +7851,7 @@
           <p:cNvPr id="8" name="Grafik 9" descr="Ein Bild, das Text enthält.&#10;&#10;Beschreibung automatisch generiert.">
             <a:extLst>
               <a:ext uri="{FF2B5EF4-FFF2-40B4-BE49-F238E27FC236}">
-                <a16:creationId xmlns:a16="http://schemas.microsoft.com/office/drawing/2014/main" xmlns="" id="{D23C034A-D10B-45B2-8311-9330461D3CFC}"/>
+                <a16:creationId xmlns:a16="http://schemas.microsoft.com/office/drawing/2014/main" id="{D23C034A-D10B-45B2-8311-9330461D3CFC}"/>
               </a:ext>
             </a:extLst>
           </p:cNvPr>
@@ -7642,7 +7880,7 @@
           <p:cNvPr id="13" name="Grafik 13" descr="Ein Bild, das Text enthält.&#10;&#10;Beschreibung automatisch generiert.">
             <a:extLst>
               <a:ext uri="{FF2B5EF4-FFF2-40B4-BE49-F238E27FC236}">
-                <a16:creationId xmlns:a16="http://schemas.microsoft.com/office/drawing/2014/main" xmlns="" id="{F04DB289-B3C5-43A6-8E11-7E2B74A98914}"/>
+                <a16:creationId xmlns:a16="http://schemas.microsoft.com/office/drawing/2014/main" id="{F04DB289-B3C5-43A6-8E11-7E2B74A98914}"/>
               </a:ext>
             </a:extLst>
           </p:cNvPr>
@@ -7701,7 +7939,7 @@
           <p:cNvPr id="2" name="Titel 1">
             <a:extLst>
               <a:ext uri="{FF2B5EF4-FFF2-40B4-BE49-F238E27FC236}">
-                <a16:creationId xmlns:a16="http://schemas.microsoft.com/office/drawing/2014/main" xmlns="" id="{5DE51B34-B75C-7E44-9C0F-EBFE5105E148}"/>
+                <a16:creationId xmlns:a16="http://schemas.microsoft.com/office/drawing/2014/main" id="{5DE51B34-B75C-7E44-9C0F-EBFE5105E148}"/>
               </a:ext>
             </a:extLst>
           </p:cNvPr>
@@ -7729,7 +7967,7 @@
           <p:cNvPr id="7" name="Inhaltsplatzhalter 6" descr="Ein Bild, das Text enthält.&#10;&#10;Automatisch generierte Beschreibung">
             <a:extLst>
               <a:ext uri="{FF2B5EF4-FFF2-40B4-BE49-F238E27FC236}">
-                <a16:creationId xmlns:a16="http://schemas.microsoft.com/office/drawing/2014/main" xmlns="" id="{8B03E9B0-CB1D-FB4D-B201-5E54BB311B9B}"/>
+                <a16:creationId xmlns:a16="http://schemas.microsoft.com/office/drawing/2014/main" id="{8B03E9B0-CB1D-FB4D-B201-5E54BB311B9B}"/>
               </a:ext>
             </a:extLst>
           </p:cNvPr>
@@ -7788,7 +8026,7 @@
           <p:cNvPr id="2" name="Titel 1">
             <a:extLst>
               <a:ext uri="{FF2B5EF4-FFF2-40B4-BE49-F238E27FC236}">
-                <a16:creationId xmlns:a16="http://schemas.microsoft.com/office/drawing/2014/main" xmlns="" id="{93C1CD93-B848-084F-BBA3-68B8F892F035}"/>
+                <a16:creationId xmlns:a16="http://schemas.microsoft.com/office/drawing/2014/main" id="{93C1CD93-B848-084F-BBA3-68B8F892F035}"/>
               </a:ext>
             </a:extLst>
           </p:cNvPr>
@@ -7816,7 +8054,7 @@
           <p:cNvPr id="5" name="Inhaltsplatzhalter 4" descr="Ein Bild, das Text enthält.&#10;&#10;Automatisch generierte Beschreibung">
             <a:extLst>
               <a:ext uri="{FF2B5EF4-FFF2-40B4-BE49-F238E27FC236}">
-                <a16:creationId xmlns:a16="http://schemas.microsoft.com/office/drawing/2014/main" xmlns="" id="{B01FD024-579F-E94E-A141-2A94C4012D08}"/>
+                <a16:creationId xmlns:a16="http://schemas.microsoft.com/office/drawing/2014/main" id="{B01FD024-579F-E94E-A141-2A94C4012D08}"/>
               </a:ext>
             </a:extLst>
           </p:cNvPr>
@@ -7845,7 +8083,7 @@
           <p:cNvPr id="7" name="Rechteck 6">
             <a:extLst>
               <a:ext uri="{FF2B5EF4-FFF2-40B4-BE49-F238E27FC236}">
-                <a16:creationId xmlns:a16="http://schemas.microsoft.com/office/drawing/2014/main" xmlns="" id="{60A32F69-9442-4BFD-847C-0E51156893C9}"/>
+                <a16:creationId xmlns:a16="http://schemas.microsoft.com/office/drawing/2014/main" id="{60A32F69-9442-4BFD-847C-0E51156893C9}"/>
               </a:ext>
             </a:extLst>
           </p:cNvPr>

</xml_diff>